<commit_message>
Renamed and design edited.
</commit_message>
<xml_diff>
--- a/Device Screen.pptx
+++ b/Device Screen.pptx
@@ -109,7 +109,7 @@
   </p:defaultTextStyle>
   <p:extLst>
     <p:ext uri="{EFAFB233-063F-42B5-8137-9DF3F51BA10A}">
-      <p15:sldGuideLst xmlns:p15="http://schemas.microsoft.com/office/powerpoint/2012/main"/>
+      <p15:sldGuideLst xmlns:p15="http://schemas.microsoft.com/office/powerpoint/2012/main" xmlns=""/>
     </p:ext>
   </p:extLst>
 </p:presentation>
@@ -246,7 +246,7 @@
           <a:p>
             <a:fld id="{BBC792A3-0523-3F47-BDD7-FCD0014C791B}" type="datetimeFigureOut">
               <a:rPr lang="en-US" smtClean="0"/>
-              <a:t>1/31/16</a:t>
+              <a:t>2/20/16</a:t>
             </a:fld>
             <a:endParaRPr lang="en-US"/>
           </a:p>
@@ -416,7 +416,7 @@
           <a:p>
             <a:fld id="{BBC792A3-0523-3F47-BDD7-FCD0014C791B}" type="datetimeFigureOut">
               <a:rPr lang="en-US" smtClean="0"/>
-              <a:t>1/31/16</a:t>
+              <a:t>2/20/16</a:t>
             </a:fld>
             <a:endParaRPr lang="en-US"/>
           </a:p>
@@ -596,7 +596,7 @@
           <a:p>
             <a:fld id="{BBC792A3-0523-3F47-BDD7-FCD0014C791B}" type="datetimeFigureOut">
               <a:rPr lang="en-US" smtClean="0"/>
-              <a:t>1/31/16</a:t>
+              <a:t>2/20/16</a:t>
             </a:fld>
             <a:endParaRPr lang="en-US"/>
           </a:p>
@@ -766,7 +766,7 @@
           <a:p>
             <a:fld id="{BBC792A3-0523-3F47-BDD7-FCD0014C791B}" type="datetimeFigureOut">
               <a:rPr lang="en-US" smtClean="0"/>
-              <a:t>1/31/16</a:t>
+              <a:t>2/20/16</a:t>
             </a:fld>
             <a:endParaRPr lang="en-US"/>
           </a:p>
@@ -1012,7 +1012,7 @@
           <a:p>
             <a:fld id="{BBC792A3-0523-3F47-BDD7-FCD0014C791B}" type="datetimeFigureOut">
               <a:rPr lang="en-US" smtClean="0"/>
-              <a:t>1/31/16</a:t>
+              <a:t>2/20/16</a:t>
             </a:fld>
             <a:endParaRPr lang="en-US"/>
           </a:p>
@@ -1244,7 +1244,7 @@
           <a:p>
             <a:fld id="{BBC792A3-0523-3F47-BDD7-FCD0014C791B}" type="datetimeFigureOut">
               <a:rPr lang="en-US" smtClean="0"/>
-              <a:t>1/31/16</a:t>
+              <a:t>2/20/16</a:t>
             </a:fld>
             <a:endParaRPr lang="en-US"/>
           </a:p>
@@ -1611,7 +1611,7 @@
           <a:p>
             <a:fld id="{BBC792A3-0523-3F47-BDD7-FCD0014C791B}" type="datetimeFigureOut">
               <a:rPr lang="en-US" smtClean="0"/>
-              <a:t>1/31/16</a:t>
+              <a:t>2/20/16</a:t>
             </a:fld>
             <a:endParaRPr lang="en-US"/>
           </a:p>
@@ -1729,7 +1729,7 @@
           <a:p>
             <a:fld id="{BBC792A3-0523-3F47-BDD7-FCD0014C791B}" type="datetimeFigureOut">
               <a:rPr lang="en-US" smtClean="0"/>
-              <a:t>1/31/16</a:t>
+              <a:t>2/20/16</a:t>
             </a:fld>
             <a:endParaRPr lang="en-US"/>
           </a:p>
@@ -1824,7 +1824,7 @@
           <a:p>
             <a:fld id="{BBC792A3-0523-3F47-BDD7-FCD0014C791B}" type="datetimeFigureOut">
               <a:rPr lang="en-US" smtClean="0"/>
-              <a:t>1/31/16</a:t>
+              <a:t>2/20/16</a:t>
             </a:fld>
             <a:endParaRPr lang="en-US"/>
           </a:p>
@@ -2101,7 +2101,7 @@
           <a:p>
             <a:fld id="{BBC792A3-0523-3F47-BDD7-FCD0014C791B}" type="datetimeFigureOut">
               <a:rPr lang="en-US" smtClean="0"/>
-              <a:t>1/31/16</a:t>
+              <a:t>2/20/16</a:t>
             </a:fld>
             <a:endParaRPr lang="en-US"/>
           </a:p>
@@ -2354,7 +2354,7 @@
           <a:p>
             <a:fld id="{BBC792A3-0523-3F47-BDD7-FCD0014C791B}" type="datetimeFigureOut">
               <a:rPr lang="en-US" smtClean="0"/>
-              <a:t>1/31/16</a:t>
+              <a:t>2/20/16</a:t>
             </a:fld>
             <a:endParaRPr lang="en-US"/>
           </a:p>
@@ -2567,7 +2567,7 @@
           <a:p>
             <a:fld id="{BBC792A3-0523-3F47-BDD7-FCD0014C791B}" type="datetimeFigureOut">
               <a:rPr lang="en-US" smtClean="0"/>
-              <a:t>1/31/16</a:t>
+              <a:t>2/20/16</a:t>
             </a:fld>
             <a:endParaRPr lang="en-US"/>
           </a:p>
@@ -4406,6 +4406,66 @@
           </a:p>
         </p:txBody>
       </p:sp>
+      <p:sp>
+        <p:nvSpPr>
+          <p:cNvPr id="8" name="TextBox 7"/>
+          <p:cNvSpPr txBox="1"/>
+          <p:nvPr/>
+        </p:nvSpPr>
+        <p:spPr>
+          <a:xfrm>
+            <a:off x="2702379" y="6466959"/>
+            <a:ext cx="787332" cy="369332"/>
+          </a:xfrm>
+          <a:prstGeom prst="rect">
+            <a:avLst/>
+          </a:prstGeom>
+          <a:noFill/>
+        </p:spPr>
+        <p:txBody>
+          <a:bodyPr wrap="none" rtlCol="0">
+            <a:spAutoFit/>
+          </a:bodyPr>
+          <a:lstStyle/>
+          <a:p>
+            <a:r>
+              <a:rPr lang="en-US" dirty="0" smtClean="0"/>
+              <a:t>LOGIN</a:t>
+            </a:r>
+            <a:endParaRPr lang="en-US" dirty="0"/>
+          </a:p>
+        </p:txBody>
+      </p:sp>
+      <p:sp>
+        <p:nvSpPr>
+          <p:cNvPr id="42" name="TextBox 41"/>
+          <p:cNvSpPr txBox="1"/>
+          <p:nvPr/>
+        </p:nvSpPr>
+        <p:spPr>
+          <a:xfrm>
+            <a:off x="8551703" y="6466959"/>
+            <a:ext cx="910864" cy="369332"/>
+          </a:xfrm>
+          <a:prstGeom prst="rect">
+            <a:avLst/>
+          </a:prstGeom>
+          <a:noFill/>
+        </p:spPr>
+        <p:txBody>
+          <a:bodyPr wrap="none" rtlCol="0">
+            <a:spAutoFit/>
+          </a:bodyPr>
+          <a:lstStyle/>
+          <a:p>
+            <a:r>
+              <a:rPr lang="en-US" dirty="0" smtClean="0"/>
+              <a:t>SIGNUP</a:t>
+            </a:r>
+            <a:endParaRPr lang="en-US" dirty="0"/>
+          </a:p>
+        </p:txBody>
+      </p:sp>
     </p:spTree>
     <p:extLst>
       <p:ext uri="{BB962C8B-B14F-4D97-AF65-F5344CB8AC3E}">
@@ -4672,7 +4732,7 @@
         </p:nvGraphicFramePr>
         <p:xfrm>
           <a:off x="1248226" y="1422399"/>
-          <a:ext cx="3657600" cy="518160"/>
+          <a:ext cx="3657600" cy="518159"/>
         </p:xfrm>
         <a:graphic>
           <a:graphicData uri="http://schemas.openxmlformats.org/drawingml/2006/table">
@@ -4701,11 +4761,6 @@
                         </a:rPr>
                         <a:t>Latest </a:t>
                       </a:r>
-                      <a:endParaRPr lang="en-US" sz="1400" b="0" dirty="0" smtClean="0">
-                        <a:solidFill>
-                          <a:sysClr val="windowText" lastClr="000000"/>
-                        </a:solidFill>
-                      </a:endParaRPr>
                     </a:p>
                     <a:p>
                       <a:pPr algn="ctr"/>
@@ -4778,11 +4833,6 @@
                         </a:rPr>
                         <a:t>Sets </a:t>
                       </a:r>
-                      <a:endParaRPr lang="en-US" sz="1400" b="0" dirty="0" smtClean="0">
-                        <a:solidFill>
-                          <a:sysClr val="windowText" lastClr="000000"/>
-                        </a:solidFill>
-                      </a:endParaRPr>
                     </a:p>
                     <a:p>
                       <a:pPr algn="ctr"/>
@@ -4855,11 +4905,6 @@
                         </a:rPr>
                         <a:t>Class </a:t>
                       </a:r>
-                      <a:endParaRPr lang="en-US" sz="1400" b="0" dirty="0" smtClean="0">
-                        <a:solidFill>
-                          <a:sysClr val="windowText" lastClr="000000"/>
-                        </a:solidFill>
-                      </a:endParaRPr>
                     </a:p>
                     <a:p>
                       <a:pPr algn="ctr"/>
@@ -4932,11 +4977,6 @@
                         </a:rPr>
                         <a:t>Folder </a:t>
                       </a:r>
-                      <a:endParaRPr lang="en-US" sz="1400" b="0" dirty="0" smtClean="0">
-                        <a:solidFill>
-                          <a:sysClr val="windowText" lastClr="000000"/>
-                        </a:solidFill>
-                      </a:endParaRPr>
                     </a:p>
                     <a:p>
                       <a:pPr algn="ctr"/>
@@ -5691,6 +5731,66 @@
           </a:p>
         </p:txBody>
       </p:sp>
+      <p:sp>
+        <p:nvSpPr>
+          <p:cNvPr id="30" name="TextBox 29"/>
+          <p:cNvSpPr txBox="1"/>
+          <p:nvPr/>
+        </p:nvSpPr>
+        <p:spPr>
+          <a:xfrm>
+            <a:off x="2759342" y="6468836"/>
+            <a:ext cx="791841" cy="369332"/>
+          </a:xfrm>
+          <a:prstGeom prst="rect">
+            <a:avLst/>
+          </a:prstGeom>
+          <a:noFill/>
+        </p:spPr>
+        <p:txBody>
+          <a:bodyPr wrap="none" rtlCol="0">
+            <a:spAutoFit/>
+          </a:bodyPr>
+          <a:lstStyle/>
+          <a:p>
+            <a:r>
+              <a:rPr lang="en-US" dirty="0" smtClean="0"/>
+              <a:t>MENU</a:t>
+            </a:r>
+            <a:endParaRPr lang="en-US" dirty="0"/>
+          </a:p>
+        </p:txBody>
+      </p:sp>
+      <p:sp>
+        <p:nvSpPr>
+          <p:cNvPr id="39" name="TextBox 38"/>
+          <p:cNvSpPr txBox="1"/>
+          <p:nvPr/>
+        </p:nvSpPr>
+        <p:spPr>
+          <a:xfrm>
+            <a:off x="8280603" y="6488668"/>
+            <a:ext cx="1736373" cy="369332"/>
+          </a:xfrm>
+          <a:prstGeom prst="rect">
+            <a:avLst/>
+          </a:prstGeom>
+          <a:noFill/>
+        </p:spPr>
+        <p:txBody>
+          <a:bodyPr wrap="none" rtlCol="0">
+            <a:spAutoFit/>
+          </a:bodyPr>
+          <a:lstStyle/>
+          <a:p>
+            <a:r>
+              <a:rPr lang="en-US" dirty="0" smtClean="0"/>
+              <a:t>WORDBOOKLIST</a:t>
+            </a:r>
+            <a:endParaRPr lang="en-US" dirty="0"/>
+          </a:p>
+        </p:txBody>
+      </p:sp>
     </p:spTree>
     <p:extLst>
       <p:ext uri="{BB962C8B-B14F-4D97-AF65-F5344CB8AC3E}">
@@ -6396,6 +6496,66 @@
           </a:p>
         </p:txBody>
       </p:sp>
+      <p:sp>
+        <p:nvSpPr>
+          <p:cNvPr id="26" name="TextBox 25"/>
+          <p:cNvSpPr txBox="1"/>
+          <p:nvPr/>
+        </p:nvSpPr>
+        <p:spPr>
+          <a:xfrm>
+            <a:off x="8728529" y="6511988"/>
+            <a:ext cx="813043" cy="369332"/>
+          </a:xfrm>
+          <a:prstGeom prst="rect">
+            <a:avLst/>
+          </a:prstGeom>
+          <a:noFill/>
+        </p:spPr>
+        <p:txBody>
+          <a:bodyPr wrap="none" rtlCol="0">
+            <a:spAutoFit/>
+          </a:bodyPr>
+          <a:lstStyle/>
+          <a:p>
+            <a:r>
+              <a:rPr lang="en-US" dirty="0" smtClean="0"/>
+              <a:t>WORD</a:t>
+            </a:r>
+            <a:endParaRPr lang="en-US" dirty="0"/>
+          </a:p>
+        </p:txBody>
+      </p:sp>
+      <p:sp>
+        <p:nvSpPr>
+          <p:cNvPr id="27" name="TextBox 26"/>
+          <p:cNvSpPr txBox="1"/>
+          <p:nvPr/>
+        </p:nvSpPr>
+        <p:spPr>
+          <a:xfrm>
+            <a:off x="2636490" y="6469681"/>
+            <a:ext cx="1361370" cy="369332"/>
+          </a:xfrm>
+          <a:prstGeom prst="rect">
+            <a:avLst/>
+          </a:prstGeom>
+          <a:noFill/>
+        </p:spPr>
+        <p:txBody>
+          <a:bodyPr wrap="none" rtlCol="0">
+            <a:spAutoFit/>
+          </a:bodyPr>
+          <a:lstStyle/>
+          <a:p>
+            <a:r>
+              <a:rPr lang="en-US" smtClean="0"/>
+              <a:t>WORDBOOK</a:t>
+            </a:r>
+            <a:endParaRPr lang="en-US" dirty="0"/>
+          </a:p>
+        </p:txBody>
+      </p:sp>
     </p:spTree>
     <p:extLst>
       <p:ext uri="{BB962C8B-B14F-4D97-AF65-F5344CB8AC3E}">
@@ -7317,6 +7477,66 @@
           </a:fontRef>
         </p:style>
       </p:cxnSp>
+      <p:sp>
+        <p:nvSpPr>
+          <p:cNvPr id="28" name="TextBox 27"/>
+          <p:cNvSpPr txBox="1"/>
+          <p:nvPr/>
+        </p:nvSpPr>
+        <p:spPr>
+          <a:xfrm>
+            <a:off x="2702379" y="6466959"/>
+            <a:ext cx="894972" cy="369332"/>
+          </a:xfrm>
+          <a:prstGeom prst="rect">
+            <a:avLst/>
+          </a:prstGeom>
+          <a:noFill/>
+        </p:spPr>
+        <p:txBody>
+          <a:bodyPr wrap="none" rtlCol="0">
+            <a:spAutoFit/>
+          </a:bodyPr>
+          <a:lstStyle/>
+          <a:p>
+            <a:r>
+              <a:rPr lang="en-US" dirty="0" smtClean="0"/>
+              <a:t>MATCH</a:t>
+            </a:r>
+            <a:endParaRPr lang="en-US" dirty="0"/>
+          </a:p>
+        </p:txBody>
+      </p:sp>
+      <p:sp>
+        <p:nvSpPr>
+          <p:cNvPr id="31" name="TextBox 30"/>
+          <p:cNvSpPr txBox="1"/>
+          <p:nvPr/>
+        </p:nvSpPr>
+        <p:spPr>
+          <a:xfrm>
+            <a:off x="8883480" y="6488668"/>
+            <a:ext cx="981196" cy="369332"/>
+          </a:xfrm>
+          <a:prstGeom prst="rect">
+            <a:avLst/>
+          </a:prstGeom>
+          <a:noFill/>
+        </p:spPr>
+        <p:txBody>
+          <a:bodyPr wrap="none" rtlCol="0">
+            <a:spAutoFit/>
+          </a:bodyPr>
+          <a:lstStyle/>
+          <a:p>
+            <a:r>
+              <a:rPr lang="en-US" dirty="0" smtClean="0"/>
+              <a:t>SETTING</a:t>
+            </a:r>
+            <a:endParaRPr lang="en-US" dirty="0"/>
+          </a:p>
+        </p:txBody>
+      </p:sp>
     </p:spTree>
     <p:extLst>
       <p:ext uri="{BB962C8B-B14F-4D97-AF65-F5344CB8AC3E}">
@@ -7373,7 +7593,7 @@
     </a:clrScheme>
     <a:fontScheme name="Office">
       <a:majorFont>
-        <a:latin typeface="Calibri Light" panose="020F0302020204030204"/>
+        <a:latin typeface="Calibri Light"/>
         <a:ea typeface=""/>
         <a:cs typeface=""/>
         <a:font script="Jpan" typeface="Yu Gothic Light"/>
@@ -7408,7 +7628,7 @@
         <a:font script="Geor" typeface="Sylfaen"/>
       </a:majorFont>
       <a:minorFont>
-        <a:latin typeface="Calibri" panose="020F0502020204030204"/>
+        <a:latin typeface="Calibri"/>
         <a:ea typeface=""/>
         <a:cs typeface=""/>
         <a:font script="Jpan" typeface="Yu Gothic"/>
@@ -7585,7 +7805,7 @@
   <a:extraClrSchemeLst/>
   <a:extLst>
     <a:ext uri="{05A4C25C-085E-4340-85A3-A5531E510DB2}">
-      <thm15:themeFamily xmlns:thm15="http://schemas.microsoft.com/office/thememl/2012/main" name="Office Theme" id="{62F939B6-93AF-4DB8-9C6B-D6C7DFDC589F}" vid="{4A3C46E8-61CC-4603-A589-7422A47A8E4A}"/>
+      <thm15:themeFamily xmlns:thm15="http://schemas.microsoft.com/office/thememl/2012/main" xmlns="" name="Office Theme" id="{62F939B6-93AF-4DB8-9C6B-D6C7DFDC589F}" vid="{4A3C46E8-61CC-4603-A589-7422A47A8E4A}"/>
     </a:ext>
   </a:extLst>
 </a:theme>

</xml_diff>

<commit_message>
updated with things we need to do
</commit_message>
<xml_diff>
--- a/Device Screen.pptx
+++ b/Device Screen.pptx
@@ -7,8 +7,10 @@
   <p:sldIdLst>
     <p:sldId id="256" r:id="rId2"/>
     <p:sldId id="257" r:id="rId3"/>
-    <p:sldId id="258" r:id="rId4"/>
-    <p:sldId id="259" r:id="rId5"/>
+    <p:sldId id="261" r:id="rId4"/>
+    <p:sldId id="258" r:id="rId5"/>
+    <p:sldId id="259" r:id="rId6"/>
+    <p:sldId id="260" r:id="rId7"/>
   </p:sldIdLst>
   <p:sldSz cx="12192000" cy="6858000"/>
   <p:notesSz cx="6858000" cy="9144000"/>
@@ -109,7 +111,18 @@
   </p:defaultTextStyle>
   <p:extLst>
     <p:ext uri="{EFAFB233-063F-42B5-8137-9DF3F51BA10A}">
-      <p15:sldGuideLst xmlns:p15="http://schemas.microsoft.com/office/powerpoint/2012/main" xmlns=""/>
+      <p15:sldGuideLst xmlns:p15="http://schemas.microsoft.com/office/powerpoint/2012/main">
+        <p15:guide id="1" orient="horz" pos="2160">
+          <p15:clr>
+            <a:srgbClr val="A4A3A4"/>
+          </p15:clr>
+        </p15:guide>
+        <p15:guide id="2" pos="3840">
+          <p15:clr>
+            <a:srgbClr val="A4A3A4"/>
+          </p15:clr>
+        </p15:guide>
+      </p15:sldGuideLst>
     </p:ext>
   </p:extLst>
 </p:presentation>
@@ -157,10 +170,9 @@
           </a:lstStyle>
           <a:p>
             <a:r>
-              <a:rPr lang="en-US" smtClean="0"/>
+              <a:rPr lang="en-US"/>
               <a:t>Click to edit Master title style</a:t>
             </a:r>
-            <a:endParaRPr lang="en-US"/>
           </a:p>
         </p:txBody>
       </p:sp>
@@ -222,10 +234,9 @@
           </a:lstStyle>
           <a:p>
             <a:r>
-              <a:rPr lang="en-US" smtClean="0"/>
+              <a:rPr lang="en-US"/>
               <a:t>Click to edit Master subtitle style</a:t>
             </a:r>
-            <a:endParaRPr lang="en-US"/>
           </a:p>
         </p:txBody>
       </p:sp>
@@ -246,7 +257,7 @@
           <a:p>
             <a:fld id="{BBC792A3-0523-3F47-BDD7-FCD0014C791B}" type="datetimeFigureOut">
               <a:rPr lang="en-US" smtClean="0"/>
-              <a:t>2/20/16</a:t>
+              <a:t>3/20/2016</a:t>
             </a:fld>
             <a:endParaRPr lang="en-US"/>
           </a:p>
@@ -340,10 +351,9 @@
           <a:lstStyle/>
           <a:p>
             <a:r>
-              <a:rPr lang="en-US" smtClean="0"/>
+              <a:rPr lang="en-US"/>
               <a:t>Click to edit Master title style</a:t>
             </a:r>
-            <a:endParaRPr lang="en-US"/>
           </a:p>
         </p:txBody>
       </p:sp>
@@ -364,38 +374,37 @@
           <a:p>
             <a:pPr lvl="0"/>
             <a:r>
-              <a:rPr lang="en-US" smtClean="0"/>
+              <a:rPr lang="en-US"/>
               <a:t>Click to edit Master text styles</a:t>
             </a:r>
           </a:p>
           <a:p>
             <a:pPr lvl="1"/>
             <a:r>
-              <a:rPr lang="en-US" smtClean="0"/>
+              <a:rPr lang="en-US"/>
               <a:t>Second level</a:t>
             </a:r>
           </a:p>
           <a:p>
             <a:pPr lvl="2"/>
             <a:r>
-              <a:rPr lang="en-US" smtClean="0"/>
+              <a:rPr lang="en-US"/>
               <a:t>Third level</a:t>
             </a:r>
           </a:p>
           <a:p>
             <a:pPr lvl="3"/>
             <a:r>
-              <a:rPr lang="en-US" smtClean="0"/>
+              <a:rPr lang="en-US"/>
               <a:t>Fourth level</a:t>
             </a:r>
           </a:p>
           <a:p>
             <a:pPr lvl="4"/>
             <a:r>
-              <a:rPr lang="en-US" smtClean="0"/>
+              <a:rPr lang="en-US"/>
               <a:t>Fifth level</a:t>
             </a:r>
-            <a:endParaRPr lang="en-US"/>
           </a:p>
         </p:txBody>
       </p:sp>
@@ -416,7 +425,7 @@
           <a:p>
             <a:fld id="{BBC792A3-0523-3F47-BDD7-FCD0014C791B}" type="datetimeFigureOut">
               <a:rPr lang="en-US" smtClean="0"/>
-              <a:t>2/20/16</a:t>
+              <a:t>3/20/2016</a:t>
             </a:fld>
             <a:endParaRPr lang="en-US"/>
           </a:p>
@@ -515,10 +524,9 @@
           <a:lstStyle/>
           <a:p>
             <a:r>
-              <a:rPr lang="en-US" smtClean="0"/>
+              <a:rPr lang="en-US"/>
               <a:t>Click to edit Master title style</a:t>
             </a:r>
-            <a:endParaRPr lang="en-US"/>
           </a:p>
         </p:txBody>
       </p:sp>
@@ -544,38 +552,37 @@
           <a:p>
             <a:pPr lvl="0"/>
             <a:r>
-              <a:rPr lang="en-US" smtClean="0"/>
+              <a:rPr lang="en-US"/>
               <a:t>Click to edit Master text styles</a:t>
             </a:r>
           </a:p>
           <a:p>
             <a:pPr lvl="1"/>
             <a:r>
-              <a:rPr lang="en-US" smtClean="0"/>
+              <a:rPr lang="en-US"/>
               <a:t>Second level</a:t>
             </a:r>
           </a:p>
           <a:p>
             <a:pPr lvl="2"/>
             <a:r>
-              <a:rPr lang="en-US" smtClean="0"/>
+              <a:rPr lang="en-US"/>
               <a:t>Third level</a:t>
             </a:r>
           </a:p>
           <a:p>
             <a:pPr lvl="3"/>
             <a:r>
-              <a:rPr lang="en-US" smtClean="0"/>
+              <a:rPr lang="en-US"/>
               <a:t>Fourth level</a:t>
             </a:r>
           </a:p>
           <a:p>
             <a:pPr lvl="4"/>
             <a:r>
-              <a:rPr lang="en-US" smtClean="0"/>
+              <a:rPr lang="en-US"/>
               <a:t>Fifth level</a:t>
             </a:r>
-            <a:endParaRPr lang="en-US"/>
           </a:p>
         </p:txBody>
       </p:sp>
@@ -596,7 +603,7 @@
           <a:p>
             <a:fld id="{BBC792A3-0523-3F47-BDD7-FCD0014C791B}" type="datetimeFigureOut">
               <a:rPr lang="en-US" smtClean="0"/>
-              <a:t>2/20/16</a:t>
+              <a:t>3/20/2016</a:t>
             </a:fld>
             <a:endParaRPr lang="en-US"/>
           </a:p>
@@ -690,10 +697,9 @@
           <a:lstStyle/>
           <a:p>
             <a:r>
-              <a:rPr lang="en-US" smtClean="0"/>
+              <a:rPr lang="en-US"/>
               <a:t>Click to edit Master title style</a:t>
             </a:r>
-            <a:endParaRPr lang="en-US"/>
           </a:p>
         </p:txBody>
       </p:sp>
@@ -714,38 +720,37 @@
           <a:p>
             <a:pPr lvl="0"/>
             <a:r>
-              <a:rPr lang="en-US" smtClean="0"/>
+              <a:rPr lang="en-US"/>
               <a:t>Click to edit Master text styles</a:t>
             </a:r>
           </a:p>
           <a:p>
             <a:pPr lvl="1"/>
             <a:r>
-              <a:rPr lang="en-US" smtClean="0"/>
+              <a:rPr lang="en-US"/>
               <a:t>Second level</a:t>
             </a:r>
           </a:p>
           <a:p>
             <a:pPr lvl="2"/>
             <a:r>
-              <a:rPr lang="en-US" smtClean="0"/>
+              <a:rPr lang="en-US"/>
               <a:t>Third level</a:t>
             </a:r>
           </a:p>
           <a:p>
             <a:pPr lvl="3"/>
             <a:r>
-              <a:rPr lang="en-US" smtClean="0"/>
+              <a:rPr lang="en-US"/>
               <a:t>Fourth level</a:t>
             </a:r>
           </a:p>
           <a:p>
             <a:pPr lvl="4"/>
             <a:r>
-              <a:rPr lang="en-US" smtClean="0"/>
+              <a:rPr lang="en-US"/>
               <a:t>Fifth level</a:t>
             </a:r>
-            <a:endParaRPr lang="en-US"/>
           </a:p>
         </p:txBody>
       </p:sp>
@@ -766,7 +771,7 @@
           <a:p>
             <a:fld id="{BBC792A3-0523-3F47-BDD7-FCD0014C791B}" type="datetimeFigureOut">
               <a:rPr lang="en-US" smtClean="0"/>
-              <a:t>2/20/16</a:t>
+              <a:t>3/20/2016</a:t>
             </a:fld>
             <a:endParaRPr lang="en-US"/>
           </a:p>
@@ -869,10 +874,9 @@
           </a:lstStyle>
           <a:p>
             <a:r>
-              <a:rPr lang="en-US" smtClean="0"/>
+              <a:rPr lang="en-US"/>
               <a:t>Click to edit Master title style</a:t>
             </a:r>
-            <a:endParaRPr lang="en-US"/>
           </a:p>
         </p:txBody>
       </p:sp>
@@ -989,7 +993,7 @@
           <a:p>
             <a:pPr lvl="0"/>
             <a:r>
-              <a:rPr lang="en-US" smtClean="0"/>
+              <a:rPr lang="en-US"/>
               <a:t>Click to edit Master text styles</a:t>
             </a:r>
           </a:p>
@@ -1012,7 +1016,7 @@
           <a:p>
             <a:fld id="{BBC792A3-0523-3F47-BDD7-FCD0014C791B}" type="datetimeFigureOut">
               <a:rPr lang="en-US" smtClean="0"/>
-              <a:t>2/20/16</a:t>
+              <a:t>3/20/2016</a:t>
             </a:fld>
             <a:endParaRPr lang="en-US"/>
           </a:p>
@@ -1106,10 +1110,9 @@
           <a:lstStyle/>
           <a:p>
             <a:r>
-              <a:rPr lang="en-US" smtClean="0"/>
+              <a:rPr lang="en-US"/>
               <a:t>Click to edit Master title style</a:t>
             </a:r>
-            <a:endParaRPr lang="en-US"/>
           </a:p>
         </p:txBody>
       </p:sp>
@@ -1135,38 +1138,37 @@
           <a:p>
             <a:pPr lvl="0"/>
             <a:r>
-              <a:rPr lang="en-US" smtClean="0"/>
+              <a:rPr lang="en-US"/>
               <a:t>Click to edit Master text styles</a:t>
             </a:r>
           </a:p>
           <a:p>
             <a:pPr lvl="1"/>
             <a:r>
-              <a:rPr lang="en-US" smtClean="0"/>
+              <a:rPr lang="en-US"/>
               <a:t>Second level</a:t>
             </a:r>
           </a:p>
           <a:p>
             <a:pPr lvl="2"/>
             <a:r>
-              <a:rPr lang="en-US" smtClean="0"/>
+              <a:rPr lang="en-US"/>
               <a:t>Third level</a:t>
             </a:r>
           </a:p>
           <a:p>
             <a:pPr lvl="3"/>
             <a:r>
-              <a:rPr lang="en-US" smtClean="0"/>
+              <a:rPr lang="en-US"/>
               <a:t>Fourth level</a:t>
             </a:r>
           </a:p>
           <a:p>
             <a:pPr lvl="4"/>
             <a:r>
-              <a:rPr lang="en-US" smtClean="0"/>
+              <a:rPr lang="en-US"/>
               <a:t>Fifth level</a:t>
             </a:r>
-            <a:endParaRPr lang="en-US"/>
           </a:p>
         </p:txBody>
       </p:sp>
@@ -1192,38 +1194,37 @@
           <a:p>
             <a:pPr lvl="0"/>
             <a:r>
-              <a:rPr lang="en-US" smtClean="0"/>
+              <a:rPr lang="en-US"/>
               <a:t>Click to edit Master text styles</a:t>
             </a:r>
           </a:p>
           <a:p>
             <a:pPr lvl="1"/>
             <a:r>
-              <a:rPr lang="en-US" smtClean="0"/>
+              <a:rPr lang="en-US"/>
               <a:t>Second level</a:t>
             </a:r>
           </a:p>
           <a:p>
             <a:pPr lvl="2"/>
             <a:r>
-              <a:rPr lang="en-US" smtClean="0"/>
+              <a:rPr lang="en-US"/>
               <a:t>Third level</a:t>
             </a:r>
           </a:p>
           <a:p>
             <a:pPr lvl="3"/>
             <a:r>
-              <a:rPr lang="en-US" smtClean="0"/>
+              <a:rPr lang="en-US"/>
               <a:t>Fourth level</a:t>
             </a:r>
           </a:p>
           <a:p>
             <a:pPr lvl="4"/>
             <a:r>
-              <a:rPr lang="en-US" smtClean="0"/>
+              <a:rPr lang="en-US"/>
               <a:t>Fifth level</a:t>
             </a:r>
-            <a:endParaRPr lang="en-US"/>
           </a:p>
         </p:txBody>
       </p:sp>
@@ -1244,7 +1245,7 @@
           <a:p>
             <a:fld id="{BBC792A3-0523-3F47-BDD7-FCD0014C791B}" type="datetimeFigureOut">
               <a:rPr lang="en-US" smtClean="0"/>
-              <a:t>2/20/16</a:t>
+              <a:t>3/20/2016</a:t>
             </a:fld>
             <a:endParaRPr lang="en-US"/>
           </a:p>
@@ -1343,10 +1344,9 @@
           <a:lstStyle/>
           <a:p>
             <a:r>
-              <a:rPr lang="en-US" smtClean="0"/>
+              <a:rPr lang="en-US"/>
               <a:t>Click to edit Master title style</a:t>
             </a:r>
-            <a:endParaRPr lang="en-US"/>
           </a:p>
         </p:txBody>
       </p:sp>
@@ -1409,7 +1409,7 @@
           <a:p>
             <a:pPr lvl="0"/>
             <a:r>
-              <a:rPr lang="en-US" smtClean="0"/>
+              <a:rPr lang="en-US"/>
               <a:t>Click to edit Master text styles</a:t>
             </a:r>
           </a:p>
@@ -1437,38 +1437,37 @@
           <a:p>
             <a:pPr lvl="0"/>
             <a:r>
-              <a:rPr lang="en-US" smtClean="0"/>
+              <a:rPr lang="en-US"/>
               <a:t>Click to edit Master text styles</a:t>
             </a:r>
           </a:p>
           <a:p>
             <a:pPr lvl="1"/>
             <a:r>
-              <a:rPr lang="en-US" smtClean="0"/>
+              <a:rPr lang="en-US"/>
               <a:t>Second level</a:t>
             </a:r>
           </a:p>
           <a:p>
             <a:pPr lvl="2"/>
             <a:r>
-              <a:rPr lang="en-US" smtClean="0"/>
+              <a:rPr lang="en-US"/>
               <a:t>Third level</a:t>
             </a:r>
           </a:p>
           <a:p>
             <a:pPr lvl="3"/>
             <a:r>
-              <a:rPr lang="en-US" smtClean="0"/>
+              <a:rPr lang="en-US"/>
               <a:t>Fourth level</a:t>
             </a:r>
           </a:p>
           <a:p>
             <a:pPr lvl="4"/>
             <a:r>
-              <a:rPr lang="en-US" smtClean="0"/>
+              <a:rPr lang="en-US"/>
               <a:t>Fifth level</a:t>
             </a:r>
-            <a:endParaRPr lang="en-US"/>
           </a:p>
         </p:txBody>
       </p:sp>
@@ -1531,7 +1530,7 @@
           <a:p>
             <a:pPr lvl="0"/>
             <a:r>
-              <a:rPr lang="en-US" smtClean="0"/>
+              <a:rPr lang="en-US"/>
               <a:t>Click to edit Master text styles</a:t>
             </a:r>
           </a:p>
@@ -1559,38 +1558,37 @@
           <a:p>
             <a:pPr lvl="0"/>
             <a:r>
-              <a:rPr lang="en-US" smtClean="0"/>
+              <a:rPr lang="en-US"/>
               <a:t>Click to edit Master text styles</a:t>
             </a:r>
           </a:p>
           <a:p>
             <a:pPr lvl="1"/>
             <a:r>
-              <a:rPr lang="en-US" smtClean="0"/>
+              <a:rPr lang="en-US"/>
               <a:t>Second level</a:t>
             </a:r>
           </a:p>
           <a:p>
             <a:pPr lvl="2"/>
             <a:r>
-              <a:rPr lang="en-US" smtClean="0"/>
+              <a:rPr lang="en-US"/>
               <a:t>Third level</a:t>
             </a:r>
           </a:p>
           <a:p>
             <a:pPr lvl="3"/>
             <a:r>
-              <a:rPr lang="en-US" smtClean="0"/>
+              <a:rPr lang="en-US"/>
               <a:t>Fourth level</a:t>
             </a:r>
           </a:p>
           <a:p>
             <a:pPr lvl="4"/>
             <a:r>
-              <a:rPr lang="en-US" smtClean="0"/>
+              <a:rPr lang="en-US"/>
               <a:t>Fifth level</a:t>
             </a:r>
-            <a:endParaRPr lang="en-US"/>
           </a:p>
         </p:txBody>
       </p:sp>
@@ -1611,7 +1609,7 @@
           <a:p>
             <a:fld id="{BBC792A3-0523-3F47-BDD7-FCD0014C791B}" type="datetimeFigureOut">
               <a:rPr lang="en-US" smtClean="0"/>
-              <a:t>2/20/16</a:t>
+              <a:t>3/20/2016</a:t>
             </a:fld>
             <a:endParaRPr lang="en-US"/>
           </a:p>
@@ -1705,10 +1703,9 @@
           <a:lstStyle/>
           <a:p>
             <a:r>
-              <a:rPr lang="en-US" smtClean="0"/>
+              <a:rPr lang="en-US"/>
               <a:t>Click to edit Master title style</a:t>
             </a:r>
-            <a:endParaRPr lang="en-US"/>
           </a:p>
         </p:txBody>
       </p:sp>
@@ -1729,7 +1726,7 @@
           <a:p>
             <a:fld id="{BBC792A3-0523-3F47-BDD7-FCD0014C791B}" type="datetimeFigureOut">
               <a:rPr lang="en-US" smtClean="0"/>
-              <a:t>2/20/16</a:t>
+              <a:t>3/20/2016</a:t>
             </a:fld>
             <a:endParaRPr lang="en-US"/>
           </a:p>
@@ -1824,7 +1821,7 @@
           <a:p>
             <a:fld id="{BBC792A3-0523-3F47-BDD7-FCD0014C791B}" type="datetimeFigureOut">
               <a:rPr lang="en-US" smtClean="0"/>
-              <a:t>2/20/16</a:t>
+              <a:t>3/20/2016</a:t>
             </a:fld>
             <a:endParaRPr lang="en-US"/>
           </a:p>
@@ -1927,10 +1924,9 @@
           </a:lstStyle>
           <a:p>
             <a:r>
-              <a:rPr lang="en-US" smtClean="0"/>
+              <a:rPr lang="en-US"/>
               <a:t>Click to edit Master title style</a:t>
             </a:r>
-            <a:endParaRPr lang="en-US"/>
           </a:p>
         </p:txBody>
       </p:sp>
@@ -1984,38 +1980,37 @@
           <a:p>
             <a:pPr lvl="0"/>
             <a:r>
-              <a:rPr lang="en-US" smtClean="0"/>
+              <a:rPr lang="en-US"/>
               <a:t>Click to edit Master text styles</a:t>
             </a:r>
           </a:p>
           <a:p>
             <a:pPr lvl="1"/>
             <a:r>
-              <a:rPr lang="en-US" smtClean="0"/>
+              <a:rPr lang="en-US"/>
               <a:t>Second level</a:t>
             </a:r>
           </a:p>
           <a:p>
             <a:pPr lvl="2"/>
             <a:r>
-              <a:rPr lang="en-US" smtClean="0"/>
+              <a:rPr lang="en-US"/>
               <a:t>Third level</a:t>
             </a:r>
           </a:p>
           <a:p>
             <a:pPr lvl="3"/>
             <a:r>
-              <a:rPr lang="en-US" smtClean="0"/>
+              <a:rPr lang="en-US"/>
               <a:t>Fourth level</a:t>
             </a:r>
           </a:p>
           <a:p>
             <a:pPr lvl="4"/>
             <a:r>
-              <a:rPr lang="en-US" smtClean="0"/>
+              <a:rPr lang="en-US"/>
               <a:t>Fifth level</a:t>
             </a:r>
-            <a:endParaRPr lang="en-US"/>
           </a:p>
         </p:txBody>
       </p:sp>
@@ -2078,7 +2073,7 @@
           <a:p>
             <a:pPr lvl="0"/>
             <a:r>
-              <a:rPr lang="en-US" smtClean="0"/>
+              <a:rPr lang="en-US"/>
               <a:t>Click to edit Master text styles</a:t>
             </a:r>
           </a:p>
@@ -2101,7 +2096,7 @@
           <a:p>
             <a:fld id="{BBC792A3-0523-3F47-BDD7-FCD0014C791B}" type="datetimeFigureOut">
               <a:rPr lang="en-US" smtClean="0"/>
-              <a:t>2/20/16</a:t>
+              <a:t>3/20/2016</a:t>
             </a:fld>
             <a:endParaRPr lang="en-US"/>
           </a:p>
@@ -2204,10 +2199,9 @@
           </a:lstStyle>
           <a:p>
             <a:r>
-              <a:rPr lang="en-US" smtClean="0"/>
+              <a:rPr lang="en-US"/>
               <a:t>Click to edit Master title style</a:t>
             </a:r>
-            <a:endParaRPr lang="en-US"/>
           </a:p>
         </p:txBody>
       </p:sp>
@@ -2331,7 +2325,7 @@
           <a:p>
             <a:pPr lvl="0"/>
             <a:r>
-              <a:rPr lang="en-US" smtClean="0"/>
+              <a:rPr lang="en-US"/>
               <a:t>Click to edit Master text styles</a:t>
             </a:r>
           </a:p>
@@ -2354,7 +2348,7 @@
           <a:p>
             <a:fld id="{BBC792A3-0523-3F47-BDD7-FCD0014C791B}" type="datetimeFigureOut">
               <a:rPr lang="en-US" smtClean="0"/>
-              <a:t>2/20/16</a:t>
+              <a:t>3/20/2016</a:t>
             </a:fld>
             <a:endParaRPr lang="en-US"/>
           </a:p>
@@ -2463,10 +2457,9 @@
           <a:lstStyle/>
           <a:p>
             <a:r>
-              <a:rPr lang="en-US" smtClean="0"/>
+              <a:rPr lang="en-US"/>
               <a:t>Click to edit Master title style</a:t>
             </a:r>
-            <a:endParaRPr lang="en-US"/>
           </a:p>
         </p:txBody>
       </p:sp>
@@ -2497,38 +2490,37 @@
           <a:p>
             <a:pPr lvl="0"/>
             <a:r>
-              <a:rPr lang="en-US" smtClean="0"/>
+              <a:rPr lang="en-US"/>
               <a:t>Click to edit Master text styles</a:t>
             </a:r>
           </a:p>
           <a:p>
             <a:pPr lvl="1"/>
             <a:r>
-              <a:rPr lang="en-US" smtClean="0"/>
+              <a:rPr lang="en-US"/>
               <a:t>Second level</a:t>
             </a:r>
           </a:p>
           <a:p>
             <a:pPr lvl="2"/>
             <a:r>
-              <a:rPr lang="en-US" smtClean="0"/>
+              <a:rPr lang="en-US"/>
               <a:t>Third level</a:t>
             </a:r>
           </a:p>
           <a:p>
             <a:pPr lvl="3"/>
             <a:r>
-              <a:rPr lang="en-US" smtClean="0"/>
+              <a:rPr lang="en-US"/>
               <a:t>Fourth level</a:t>
             </a:r>
           </a:p>
           <a:p>
             <a:pPr lvl="4"/>
             <a:r>
-              <a:rPr lang="en-US" smtClean="0"/>
+              <a:rPr lang="en-US"/>
               <a:t>Fifth level</a:t>
             </a:r>
-            <a:endParaRPr lang="en-US"/>
           </a:p>
         </p:txBody>
       </p:sp>
@@ -2567,7 +2559,7 @@
           <a:p>
             <a:fld id="{BBC792A3-0523-3F47-BDD7-FCD0014C791B}" type="datetimeFigureOut">
               <a:rPr lang="en-US" smtClean="0"/>
-              <a:t>2/20/16</a:t>
+              <a:t>3/20/2016</a:t>
             </a:fld>
             <a:endParaRPr lang="en-US"/>
           </a:p>
@@ -3688,10 +3680,9 @@
           <a:p>
             <a:pPr algn="ctr"/>
             <a:r>
-              <a:rPr lang="en-US" sz="1200" dirty="0" smtClean="0"/>
+              <a:rPr lang="en-US" sz="1200" dirty="0"/>
               <a:t>Username</a:t>
             </a:r>
-            <a:endParaRPr lang="en-US" sz="1200" dirty="0"/>
           </a:p>
         </p:txBody>
       </p:sp>
@@ -3719,10 +3710,9 @@
           <a:p>
             <a:pPr algn="ctr"/>
             <a:r>
-              <a:rPr lang="en-US" sz="1200" dirty="0" smtClean="0"/>
+              <a:rPr lang="en-US" sz="1200" dirty="0"/>
               <a:t>Password</a:t>
             </a:r>
-            <a:endParaRPr lang="en-US" sz="1200" dirty="0"/>
           </a:p>
         </p:txBody>
       </p:sp>
@@ -3750,10 +3740,9 @@
           <a:p>
             <a:pPr algn="ctr"/>
             <a:r>
-              <a:rPr lang="en-US" sz="1400" dirty="0" smtClean="0"/>
+              <a:rPr lang="en-US" sz="1400" dirty="0"/>
               <a:t>SIGN UP with Facebook</a:t>
             </a:r>
-            <a:endParaRPr lang="en-US" sz="1400" dirty="0"/>
           </a:p>
         </p:txBody>
       </p:sp>
@@ -3781,10 +3770,9 @@
           <a:p>
             <a:pPr algn="ctr"/>
             <a:r>
-              <a:rPr lang="en-US" sz="1400" dirty="0" smtClean="0"/>
+              <a:rPr lang="en-US" sz="1400" dirty="0"/>
               <a:t>SIGN UP</a:t>
             </a:r>
-            <a:endParaRPr lang="en-US" sz="1400" dirty="0"/>
           </a:p>
         </p:txBody>
       </p:sp>
@@ -3812,24 +3800,23 @@
           <a:p>
             <a:pPr algn="ctr"/>
             <a:r>
-              <a:rPr lang="en-US" sz="1400" dirty="0" smtClean="0"/>
+              <a:rPr lang="en-US" sz="1400" dirty="0"/>
               <a:t>LOGO</a:t>
             </a:r>
           </a:p>
           <a:p>
             <a:pPr algn="ctr"/>
             <a:r>
-              <a:rPr lang="en-US" sz="1400" dirty="0" smtClean="0"/>
+              <a:rPr lang="en-US" sz="1400" dirty="0"/>
               <a:t>+</a:t>
             </a:r>
           </a:p>
           <a:p>
             <a:pPr algn="ctr"/>
             <a:r>
-              <a:rPr lang="en-US" sz="1400" dirty="0" smtClean="0"/>
+              <a:rPr lang="en-US" sz="1400" dirty="0"/>
               <a:t>Flashcards</a:t>
             </a:r>
-            <a:endParaRPr lang="en-US" sz="1400" dirty="0"/>
           </a:p>
         </p:txBody>
       </p:sp>
@@ -3857,10 +3844,9 @@
           <a:p>
             <a:pPr algn="ctr"/>
             <a:r>
-              <a:rPr lang="en-US" sz="1400" dirty="0" smtClean="0"/>
+              <a:rPr lang="en-US" sz="1400" dirty="0"/>
               <a:t>SIGN UP with Google+</a:t>
             </a:r>
-            <a:endParaRPr lang="en-US" sz="1400" dirty="0"/>
           </a:p>
         </p:txBody>
       </p:sp>
@@ -3948,10 +3934,9 @@
           <a:p>
             <a:pPr algn="ctr"/>
             <a:r>
-              <a:rPr lang="en-US" sz="1000" dirty="0" smtClean="0"/>
+              <a:rPr lang="en-US" sz="1000" dirty="0"/>
               <a:t>Or, Create a new account</a:t>
             </a:r>
-            <a:endParaRPr lang="en-US" sz="1000" dirty="0"/>
           </a:p>
         </p:txBody>
       </p:sp>
@@ -3979,7 +3964,7 @@
           <a:p>
             <a:pPr algn="ctr"/>
             <a:r>
-              <a:rPr lang="en-US" sz="1400" smtClean="0"/>
+              <a:rPr lang="en-US" sz="1400"/>
               <a:t>LOG IN</a:t>
             </a:r>
             <a:endParaRPr lang="en-US" sz="1400" dirty="0"/>
@@ -4010,10 +3995,9 @@
           <a:p>
             <a:pPr algn="ctr"/>
             <a:r>
-              <a:rPr lang="en-US" sz="1200" dirty="0" smtClean="0"/>
+              <a:rPr lang="en-US" sz="1200" dirty="0"/>
               <a:t>Username</a:t>
             </a:r>
-            <a:endParaRPr lang="en-US" sz="1200" dirty="0"/>
           </a:p>
         </p:txBody>
       </p:sp>
@@ -4041,10 +4025,9 @@
           <a:p>
             <a:pPr algn="ctr"/>
             <a:r>
-              <a:rPr lang="en-US" sz="1200" dirty="0" smtClean="0"/>
+              <a:rPr lang="en-US" sz="1200" dirty="0"/>
               <a:t>Password</a:t>
             </a:r>
-            <a:endParaRPr lang="en-US" sz="1200" dirty="0"/>
           </a:p>
         </p:txBody>
       </p:sp>
@@ -4072,10 +4055,9 @@
           <a:p>
             <a:pPr algn="ctr"/>
             <a:r>
-              <a:rPr lang="en-US" sz="1200" dirty="0" smtClean="0"/>
+              <a:rPr lang="en-US" sz="1200" dirty="0"/>
               <a:t>Password (again)</a:t>
             </a:r>
-            <a:endParaRPr lang="en-US" sz="1200" dirty="0"/>
           </a:p>
         </p:txBody>
       </p:sp>
@@ -4103,10 +4085,9 @@
           <a:p>
             <a:pPr algn="ctr"/>
             <a:r>
-              <a:rPr lang="en-US" sz="1200" dirty="0" smtClean="0"/>
+              <a:rPr lang="en-US" sz="1200" dirty="0"/>
               <a:t>Email</a:t>
             </a:r>
-            <a:endParaRPr lang="en-US" sz="1200" dirty="0"/>
           </a:p>
         </p:txBody>
       </p:sp>
@@ -4133,15 +4114,15 @@
           <a:lstStyle/>
           <a:p>
             <a:r>
-              <a:rPr lang="en-US" sz="1050" dirty="0" smtClean="0"/>
+              <a:rPr lang="en-US" sz="1050" dirty="0"/>
               <a:t>I have read the </a:t>
             </a:r>
             <a:r>
-              <a:rPr lang="en-US" sz="1050" u="sng" dirty="0" smtClean="0"/>
+              <a:rPr lang="en-US" sz="1050" u="sng" dirty="0"/>
               <a:t>Terms and Services</a:t>
             </a:r>
             <a:r>
-              <a:rPr lang="en-US" sz="1050" dirty="0" smtClean="0"/>
+              <a:rPr lang="en-US" sz="1050" dirty="0"/>
               <a:t> and therefore agree to it.</a:t>
             </a:r>
             <a:endParaRPr lang="en-US" sz="1050" u="sng" dirty="0"/>
@@ -4171,10 +4152,9 @@
           <a:lstStyle/>
           <a:p>
             <a:r>
-              <a:rPr lang="en-US" sz="1050" dirty="0" smtClean="0"/>
+              <a:rPr lang="en-US" sz="1050" dirty="0"/>
               <a:t>I am under the age of 13</a:t>
             </a:r>
-            <a:endParaRPr lang="en-US" sz="1050" dirty="0"/>
           </a:p>
         </p:txBody>
       </p:sp>
@@ -4201,10 +4181,9 @@
           <a:lstStyle/>
           <a:p>
             <a:r>
-              <a:rPr lang="en-US" dirty="0" smtClean="0"/>
+              <a:rPr lang="en-US" dirty="0"/>
               <a:t>View_2</a:t>
             </a:r>
-            <a:endParaRPr lang="en-US" dirty="0"/>
           </a:p>
         </p:txBody>
       </p:sp>
@@ -4231,10 +4210,9 @@
           <a:lstStyle/>
           <a:p>
             <a:r>
-              <a:rPr lang="en-US" dirty="0" smtClean="0"/>
+              <a:rPr lang="en-US" dirty="0"/>
               <a:t>View_3</a:t>
             </a:r>
-            <a:endParaRPr lang="en-US" dirty="0"/>
           </a:p>
         </p:txBody>
       </p:sp>
@@ -4354,17 +4332,16 @@
           <a:p>
             <a:pPr algn="ctr"/>
             <a:r>
-              <a:rPr lang="en-US" sz="1400" dirty="0" smtClean="0"/>
+              <a:rPr lang="en-US" sz="1400" dirty="0"/>
               <a:t>LOG IN</a:t>
             </a:r>
           </a:p>
           <a:p>
             <a:pPr algn="ctr"/>
             <a:r>
-              <a:rPr lang="en-US" sz="1400" dirty="0" smtClean="0"/>
+              <a:rPr lang="en-US" sz="1400" dirty="0"/>
               <a:t>with Facebook</a:t>
             </a:r>
-            <a:endParaRPr lang="en-US" sz="1400" dirty="0"/>
           </a:p>
         </p:txBody>
       </p:sp>
@@ -4392,17 +4369,16 @@
           <a:p>
             <a:pPr algn="ctr"/>
             <a:r>
-              <a:rPr lang="en-US" sz="1400" dirty="0" smtClean="0"/>
+              <a:rPr lang="en-US" sz="1400" dirty="0"/>
               <a:t>LOG IN</a:t>
             </a:r>
           </a:p>
           <a:p>
             <a:pPr algn="ctr"/>
             <a:r>
-              <a:rPr lang="en-US" sz="1400" dirty="0" smtClean="0"/>
+              <a:rPr lang="en-US" sz="1400" dirty="0"/>
               <a:t>with Google+</a:t>
             </a:r>
-            <a:endParaRPr lang="en-US" sz="1400" dirty="0"/>
           </a:p>
         </p:txBody>
       </p:sp>
@@ -4429,10 +4405,9 @@
           <a:lstStyle/>
           <a:p>
             <a:r>
-              <a:rPr lang="en-US" dirty="0" smtClean="0"/>
+              <a:rPr lang="en-US" dirty="0"/>
               <a:t>LOGIN</a:t>
             </a:r>
-            <a:endParaRPr lang="en-US" dirty="0"/>
           </a:p>
         </p:txBody>
       </p:sp>
@@ -4459,10 +4434,9 @@
           <a:lstStyle/>
           <a:p>
             <a:r>
-              <a:rPr lang="en-US" dirty="0" smtClean="0"/>
+              <a:rPr lang="en-US" dirty="0"/>
               <a:t>SIGNUP</a:t>
             </a:r>
-            <a:endParaRPr lang="en-US" dirty="0"/>
           </a:p>
         </p:txBody>
       </p:sp>
@@ -4613,10 +4587,9 @@
           <a:lstStyle/>
           <a:p>
             <a:r>
-              <a:rPr lang="en-US" dirty="0" smtClean="0"/>
+              <a:rPr lang="en-US" dirty="0"/>
               <a:t>View_4</a:t>
             </a:r>
-            <a:endParaRPr lang="en-US" dirty="0"/>
           </a:p>
         </p:txBody>
       </p:sp>
@@ -4673,10 +4646,9 @@
           <a:lstStyle/>
           <a:p>
             <a:r>
-              <a:rPr lang="en-US" smtClean="0"/>
+              <a:rPr lang="en-US"/>
               <a:t>LOGO</a:t>
             </a:r>
-            <a:endParaRPr lang="en-US"/>
           </a:p>
         </p:txBody>
       </p:sp>
@@ -4703,16 +4675,15 @@
           <a:lstStyle/>
           <a:p>
             <a:r>
-              <a:rPr lang="en-US" dirty="0" smtClean="0"/>
+              <a:rPr lang="en-US" dirty="0"/>
               <a:t>Q</a:t>
             </a:r>
           </a:p>
           <a:p>
             <a:r>
-              <a:rPr lang="en-US" sz="1200" dirty="0" smtClean="0"/>
+              <a:rPr lang="en-US" sz="1200" dirty="0"/>
               <a:t>B_5</a:t>
             </a:r>
-            <a:endParaRPr lang="en-US" sz="1200" dirty="0"/>
           </a:p>
         </p:txBody>
       </p:sp>
@@ -4732,7 +4703,7 @@
         </p:nvGraphicFramePr>
         <p:xfrm>
           <a:off x="1248226" y="1422399"/>
-          <a:ext cx="3657600" cy="518159"/>
+          <a:ext cx="3657600" cy="518160"/>
         </p:xfrm>
         <a:graphic>
           <a:graphicData uri="http://schemas.openxmlformats.org/drawingml/2006/table">
@@ -4741,10 +4712,34 @@
                 <a:tableStyleId>{5C22544A-7EE6-4342-B048-85BDC9FD1C3A}</a:tableStyleId>
               </a:tblPr>
               <a:tblGrid>
-                <a:gridCol w="914400"/>
-                <a:gridCol w="914400"/>
-                <a:gridCol w="914400"/>
-                <a:gridCol w="914400"/>
+                <a:gridCol w="914400">
+                  <a:extLst>
+                    <a:ext uri="{9D8B030D-6E8A-4147-A177-3AD203B41FA5}">
+                      <a16:colId xmlns:a16="http://schemas.microsoft.com/office/drawing/2014/main" val="20000"/>
+                    </a:ext>
+                  </a:extLst>
+                </a:gridCol>
+                <a:gridCol w="914400">
+                  <a:extLst>
+                    <a:ext uri="{9D8B030D-6E8A-4147-A177-3AD203B41FA5}">
+                      <a16:colId xmlns:a16="http://schemas.microsoft.com/office/drawing/2014/main" val="20001"/>
+                    </a:ext>
+                  </a:extLst>
+                </a:gridCol>
+                <a:gridCol w="914400">
+                  <a:extLst>
+                    <a:ext uri="{9D8B030D-6E8A-4147-A177-3AD203B41FA5}">
+                      <a16:colId xmlns:a16="http://schemas.microsoft.com/office/drawing/2014/main" val="20002"/>
+                    </a:ext>
+                  </a:extLst>
+                </a:gridCol>
+                <a:gridCol w="914400">
+                  <a:extLst>
+                    <a:ext uri="{9D8B030D-6E8A-4147-A177-3AD203B41FA5}">
+                      <a16:colId xmlns:a16="http://schemas.microsoft.com/office/drawing/2014/main" val="20003"/>
+                    </a:ext>
+                  </a:extLst>
+                </a:gridCol>
               </a:tblGrid>
               <a:tr h="478971">
                 <a:tc>
@@ -4754,7 +4749,7 @@
                     <a:p>
                       <a:pPr algn="ctr"/>
                       <a:r>
-                        <a:rPr lang="en-US" sz="1400" b="0" dirty="0" smtClean="0">
+                        <a:rPr lang="en-US" sz="1400" b="0" dirty="0">
                           <a:solidFill>
                             <a:sysClr val="windowText" lastClr="000000"/>
                           </a:solidFill>
@@ -4765,18 +4760,13 @@
                     <a:p>
                       <a:pPr algn="ctr"/>
                       <a:r>
-                        <a:rPr lang="en-US" sz="1400" b="0" dirty="0" smtClean="0">
+                        <a:rPr lang="en-US" sz="1400" b="0" dirty="0">
                           <a:solidFill>
                             <a:sysClr val="windowText" lastClr="000000"/>
                           </a:solidFill>
                         </a:rPr>
                         <a:t>B_1</a:t>
                       </a:r>
-                      <a:endParaRPr lang="en-US" sz="1400" b="0" dirty="0">
-                        <a:solidFill>
-                          <a:sysClr val="windowText" lastClr="000000"/>
-                        </a:solidFill>
-                      </a:endParaRPr>
                     </a:p>
                   </a:txBody>
                   <a:tcPr>
@@ -4826,7 +4816,7 @@
                     <a:p>
                       <a:pPr algn="ctr"/>
                       <a:r>
-                        <a:rPr lang="en-US" sz="1400" b="0" dirty="0" smtClean="0">
+                        <a:rPr lang="en-US" sz="1400" b="0" dirty="0">
                           <a:solidFill>
                             <a:sysClr val="windowText" lastClr="000000"/>
                           </a:solidFill>
@@ -4837,18 +4827,13 @@
                     <a:p>
                       <a:pPr algn="ctr"/>
                       <a:r>
-                        <a:rPr lang="en-US" sz="1400" b="0" dirty="0" smtClean="0">
+                        <a:rPr lang="en-US" sz="1400" b="0" dirty="0">
                           <a:solidFill>
                             <a:sysClr val="windowText" lastClr="000000"/>
                           </a:solidFill>
                         </a:rPr>
                         <a:t>B_2</a:t>
                       </a:r>
-                      <a:endParaRPr lang="en-US" sz="1400" b="0" dirty="0">
-                        <a:solidFill>
-                          <a:sysClr val="windowText" lastClr="000000"/>
-                        </a:solidFill>
-                      </a:endParaRPr>
                     </a:p>
                   </a:txBody>
                   <a:tcPr>
@@ -4898,7 +4883,7 @@
                     <a:p>
                       <a:pPr algn="ctr"/>
                       <a:r>
-                        <a:rPr lang="en-US" sz="1400" b="0" dirty="0" smtClean="0">
+                        <a:rPr lang="en-US" sz="1400" b="0" dirty="0">
                           <a:solidFill>
                             <a:sysClr val="windowText" lastClr="000000"/>
                           </a:solidFill>
@@ -4909,18 +4894,13 @@
                     <a:p>
                       <a:pPr algn="ctr"/>
                       <a:r>
-                        <a:rPr lang="en-US" sz="1400" b="0" dirty="0" smtClean="0">
+                        <a:rPr lang="en-US" sz="1400" b="0" dirty="0">
                           <a:solidFill>
                             <a:sysClr val="windowText" lastClr="000000"/>
                           </a:solidFill>
                         </a:rPr>
                         <a:t>B_3</a:t>
                       </a:r>
-                      <a:endParaRPr lang="en-US" sz="1400" b="0" dirty="0">
-                        <a:solidFill>
-                          <a:sysClr val="windowText" lastClr="000000"/>
-                        </a:solidFill>
-                      </a:endParaRPr>
                     </a:p>
                   </a:txBody>
                   <a:tcPr>
@@ -4970,7 +4950,7 @@
                     <a:p>
                       <a:pPr algn="ctr"/>
                       <a:r>
-                        <a:rPr lang="en-US" sz="1400" b="0" dirty="0" smtClean="0">
+                        <a:rPr lang="en-US" sz="1400" b="0" dirty="0">
                           <a:solidFill>
                             <a:sysClr val="windowText" lastClr="000000"/>
                           </a:solidFill>
@@ -4981,18 +4961,13 @@
                     <a:p>
                       <a:pPr algn="ctr"/>
                       <a:r>
-                        <a:rPr lang="en-US" sz="1400" b="0" dirty="0" smtClean="0">
+                        <a:rPr lang="en-US" sz="1400" b="0" dirty="0">
                           <a:solidFill>
                             <a:sysClr val="windowText" lastClr="000000"/>
                           </a:solidFill>
                         </a:rPr>
                         <a:t>B_4</a:t>
                       </a:r>
-                      <a:endParaRPr lang="en-US" sz="1400" b="0" dirty="0">
-                        <a:solidFill>
-                          <a:sysClr val="windowText" lastClr="000000"/>
-                        </a:solidFill>
-                      </a:endParaRPr>
                     </a:p>
                   </a:txBody>
                   <a:tcPr>
@@ -5035,6 +5010,11 @@
                     <a:noFill/>
                   </a:tcPr>
                 </a:tc>
+                <a:extLst>
+                  <a:ext uri="{0D108BD9-81ED-4DB2-BD59-A6C34878D82A}">
+                    <a16:rowId xmlns:a16="http://schemas.microsoft.com/office/drawing/2014/main" val="10000"/>
+                  </a:ext>
+                </a:extLst>
               </a:tr>
             </a:tbl>
           </a:graphicData>
@@ -5183,10 +5163,9 @@
           <a:lstStyle/>
           <a:p>
             <a:r>
-              <a:rPr lang="en-US" smtClean="0"/>
+              <a:rPr lang="en-US"/>
               <a:t>View_5</a:t>
             </a:r>
-            <a:endParaRPr lang="en-US"/>
           </a:p>
         </p:txBody>
       </p:sp>
@@ -5213,7 +5192,7 @@
           <a:lstStyle/>
           <a:p>
             <a:r>
-              <a:rPr lang="en-US" dirty="0" smtClean="0">
+              <a:rPr lang="en-US" dirty="0">
                 <a:sym typeface="Wingdings"/>
               </a:rPr>
               <a:t> </a:t>
@@ -5246,27 +5225,23 @@
           <a:p>
             <a:pPr algn="ctr"/>
             <a:r>
-              <a:rPr lang="en-US" sz="2400" dirty="0" smtClean="0"/>
+              <a:rPr lang="en-US" sz="2400" dirty="0"/>
               <a:t>SET TITLE</a:t>
             </a:r>
           </a:p>
           <a:p>
             <a:pPr algn="ctr"/>
             <a:r>
-              <a:rPr lang="en-US" sz="1600" i="1" u="sng" dirty="0" smtClean="0"/>
+              <a:rPr lang="en-US" sz="1600" i="1" u="sng" dirty="0"/>
               <a:t># terms</a:t>
             </a:r>
             <a:r>
-              <a:rPr lang="en-US" sz="1600" dirty="0" smtClean="0"/>
+              <a:rPr lang="en-US" sz="1600" dirty="0"/>
               <a:t> by </a:t>
             </a:r>
             <a:r>
               <a:rPr lang="en-US" sz="1600" i="1" u="sng" dirty="0"/>
-              <a:t>c</a:t>
-            </a:r>
-            <a:r>
-              <a:rPr lang="en-US" sz="1600" i="1" u="sng" dirty="0" smtClean="0"/>
-              <a:t>reator</a:t>
+              <a:t>creator</a:t>
             </a:r>
             <a:endParaRPr lang="en-US" sz="2400" i="1" u="sng" dirty="0"/>
           </a:p>
@@ -5331,17 +5306,16 @@
           <a:p>
             <a:pPr algn="ctr"/>
             <a:r>
-              <a:rPr lang="en-US" sz="1400" dirty="0" smtClean="0"/>
+              <a:rPr lang="en-US" sz="1400" dirty="0"/>
               <a:t>Flashcards</a:t>
             </a:r>
           </a:p>
           <a:p>
             <a:pPr algn="ctr"/>
             <a:r>
-              <a:rPr lang="en-US" sz="1400" dirty="0" smtClean="0"/>
+              <a:rPr lang="en-US" sz="1400" dirty="0"/>
               <a:t>B_1</a:t>
             </a:r>
-            <a:endParaRPr lang="en-US" sz="1400" dirty="0"/>
           </a:p>
         </p:txBody>
       </p:sp>
@@ -5374,17 +5348,16 @@
           <a:p>
             <a:pPr algn="ctr"/>
             <a:r>
-              <a:rPr lang="en-US" sz="1400" dirty="0" smtClean="0"/>
+              <a:rPr lang="en-US" sz="1400" dirty="0"/>
               <a:t>Learn</a:t>
             </a:r>
           </a:p>
           <a:p>
             <a:pPr algn="ctr"/>
             <a:r>
-              <a:rPr lang="en-US" sz="1400" dirty="0" smtClean="0"/>
+              <a:rPr lang="en-US" sz="1400" dirty="0"/>
               <a:t>B_2</a:t>
             </a:r>
-            <a:endParaRPr lang="en-US" sz="1400" dirty="0"/>
           </a:p>
         </p:txBody>
       </p:sp>
@@ -5417,17 +5390,16 @@
           <a:p>
             <a:pPr algn="ctr"/>
             <a:r>
-              <a:rPr lang="en-US" sz="1400" dirty="0" smtClean="0"/>
+              <a:rPr lang="en-US" sz="1400" dirty="0"/>
               <a:t>Match</a:t>
             </a:r>
           </a:p>
           <a:p>
             <a:pPr algn="ctr"/>
             <a:r>
-              <a:rPr lang="en-US" sz="1400" dirty="0" smtClean="0"/>
+              <a:rPr lang="en-US" sz="1400" dirty="0"/>
               <a:t>B_3</a:t>
             </a:r>
-            <a:endParaRPr lang="en-US" sz="1400" dirty="0"/>
           </a:p>
         </p:txBody>
       </p:sp>
@@ -5454,10 +5426,9 @@
           <a:lstStyle/>
           <a:p>
             <a:r>
-              <a:rPr lang="en-US" sz="2400" dirty="0" smtClean="0"/>
+              <a:rPr lang="en-US" sz="2400" dirty="0"/>
               <a:t>...</a:t>
             </a:r>
-            <a:endParaRPr lang="en-US" sz="2400" dirty="0"/>
           </a:p>
         </p:txBody>
       </p:sp>
@@ -5724,10 +5695,9 @@
           <a:lstStyle/>
           <a:p>
             <a:r>
-              <a:rPr lang="en-US" sz="2400" dirty="0" smtClean="0"/>
+              <a:rPr lang="en-US" sz="2400" dirty="0"/>
               <a:t>...</a:t>
             </a:r>
-            <a:endParaRPr lang="en-US" sz="2400" dirty="0"/>
           </a:p>
         </p:txBody>
       </p:sp>
@@ -5754,10 +5724,9 @@
           <a:lstStyle/>
           <a:p>
             <a:r>
-              <a:rPr lang="en-US" dirty="0" smtClean="0"/>
+              <a:rPr lang="en-US" dirty="0"/>
               <a:t>MENU</a:t>
             </a:r>
-            <a:endParaRPr lang="en-US" dirty="0"/>
           </a:p>
         </p:txBody>
       </p:sp>
@@ -5784,10 +5753,9 @@
           <a:lstStyle/>
           <a:p>
             <a:r>
-              <a:rPr lang="en-US" dirty="0" smtClean="0"/>
+              <a:rPr lang="en-US" dirty="0"/>
               <a:t>WORDBOOKLIST</a:t>
             </a:r>
-            <a:endParaRPr lang="en-US" dirty="0"/>
           </a:p>
         </p:txBody>
       </p:sp>
@@ -5829,7 +5797,7 @@
         </p:nvSpPr>
         <p:spPr>
           <a:xfrm>
-            <a:off x="1248228" y="478972"/>
+            <a:off x="7090949" y="478972"/>
             <a:ext cx="3657600" cy="5943600"/>
           </a:xfrm>
           <a:prstGeom prst="frame">
@@ -5870,198 +5838,102 @@
       </p:sp>
       <p:sp>
         <p:nvSpPr>
-          <p:cNvPr id="3" name="Frame 2"/>
-          <p:cNvSpPr/>
-          <p:nvPr/>
-        </p:nvSpPr>
-        <p:spPr>
-          <a:xfrm>
-            <a:off x="7104742" y="478972"/>
-            <a:ext cx="3657600" cy="5943600"/>
-          </a:xfrm>
-          <a:prstGeom prst="frame">
-            <a:avLst>
-              <a:gd name="adj1" fmla="val 992"/>
-            </a:avLst>
-          </a:prstGeom>
-          <a:ln/>
+          <p:cNvPr id="3" name="TextBox 2"/>
+          <p:cNvSpPr txBox="1"/>
+          <p:nvPr/>
+        </p:nvSpPr>
+        <p:spPr>
+          <a:xfrm>
+            <a:off x="8479335" y="124154"/>
+            <a:ext cx="880819" cy="369332"/>
+          </a:xfrm>
+          <a:prstGeom prst="rect">
+            <a:avLst/>
+          </a:prstGeom>
+          <a:noFill/>
+        </p:spPr>
+        <p:txBody>
+          <a:bodyPr wrap="none" rtlCol="0">
+            <a:spAutoFit/>
+          </a:bodyPr>
+          <a:lstStyle/>
+          <a:p>
+            <a:r>
+              <a:rPr lang="en-US" dirty="0"/>
+              <a:t>View_7</a:t>
+            </a:r>
+          </a:p>
+        </p:txBody>
+      </p:sp>
+      <p:cxnSp>
+        <p:nvCxnSpPr>
+          <p:cNvPr id="4" name="Straight Connector 3"/>
+          <p:cNvCxnSpPr/>
+          <p:nvPr/>
+        </p:nvCxnSpPr>
+        <p:spPr>
+          <a:xfrm>
+            <a:off x="7090945" y="1422400"/>
+            <a:ext cx="3657602" cy="0"/>
+          </a:xfrm>
+          <a:prstGeom prst="line">
+            <a:avLst/>
+          </a:prstGeom>
         </p:spPr>
         <p:style>
-          <a:lnRef idx="2">
-            <a:schemeClr val="dk1">
-              <a:shade val="50000"/>
-            </a:schemeClr>
+          <a:lnRef idx="1">
+            <a:schemeClr val="dk1"/>
           </a:lnRef>
-          <a:fillRef idx="1">
+          <a:fillRef idx="0">
             <a:schemeClr val="dk1"/>
           </a:fillRef>
           <a:effectRef idx="0">
             <a:schemeClr val="dk1"/>
           </a:effectRef>
           <a:fontRef idx="minor">
-            <a:schemeClr val="lt1"/>
+            <a:schemeClr val="tx1"/>
           </a:fontRef>
         </p:style>
-        <p:txBody>
-          <a:bodyPr rtlCol="0" anchor="ctr"/>
-          <a:lstStyle/>
-          <a:p>
-            <a:pPr algn="ctr"/>
-            <a:endParaRPr lang="en-US">
-              <a:solidFill>
-                <a:schemeClr val="tx1"/>
-              </a:solidFill>
-            </a:endParaRPr>
-          </a:p>
-        </p:txBody>
-      </p:sp>
-      <p:sp>
-        <p:nvSpPr>
-          <p:cNvPr id="4" name="TextBox 3"/>
+      </p:cxnSp>
+      <p:sp>
+        <p:nvSpPr>
+          <p:cNvPr id="5" name="TextBox 4"/>
           <p:cNvSpPr txBox="1"/>
           <p:nvPr/>
         </p:nvSpPr>
         <p:spPr>
           <a:xfrm>
-            <a:off x="1567542" y="2111944"/>
-            <a:ext cx="3018971" cy="3323987"/>
-          </a:xfrm>
-          <a:prstGeom prst="rect">
-            <a:avLst/>
-          </a:prstGeom>
-        </p:spPr>
-        <p:style>
-          <a:lnRef idx="2">
-            <a:schemeClr val="dk1"/>
-          </a:lnRef>
-          <a:fillRef idx="1">
-            <a:schemeClr val="lt1"/>
-          </a:fillRef>
-          <a:effectRef idx="0">
-            <a:schemeClr val="dk1"/>
-          </a:effectRef>
-          <a:fontRef idx="minor">
-            <a:schemeClr val="dk1"/>
-          </a:fontRef>
-        </p:style>
-        <p:txBody>
-          <a:bodyPr wrap="square" rtlCol="0">
+            <a:off x="7568942" y="794045"/>
+            <a:ext cx="728020" cy="369332"/>
+          </a:xfrm>
+          <a:prstGeom prst="rect">
+            <a:avLst/>
+          </a:prstGeom>
+          <a:noFill/>
+        </p:spPr>
+        <p:txBody>
+          <a:bodyPr wrap="none" rtlCol="0">
             <a:spAutoFit/>
           </a:bodyPr>
           <a:lstStyle/>
           <a:p>
-            <a:pPr algn="ctr"/>
-            <a:endParaRPr lang="en-US" sz="2400" dirty="0" smtClean="0"/>
-          </a:p>
-          <a:p>
-            <a:pPr algn="ctr"/>
-            <a:endParaRPr lang="en-US" sz="2400" dirty="0" smtClean="0"/>
-          </a:p>
-          <a:p>
-            <a:pPr algn="ctr"/>
-            <a:r>
-              <a:rPr lang="en-US" sz="2400" dirty="0" smtClean="0"/>
-              <a:t>WORD</a:t>
-            </a:r>
-          </a:p>
-          <a:p>
-            <a:pPr algn="ctr"/>
-            <a:r>
-              <a:rPr lang="en-US" sz="1200" dirty="0" smtClean="0"/>
-              <a:t> </a:t>
-            </a:r>
-            <a:r>
-              <a:rPr lang="en-US" sz="2400" dirty="0" smtClean="0"/>
-              <a:t> </a:t>
-            </a:r>
-          </a:p>
-          <a:p>
-            <a:pPr algn="ctr"/>
-            <a:endParaRPr lang="en-US" sz="2400" dirty="0" smtClean="0"/>
-          </a:p>
-          <a:p>
-            <a:pPr algn="ctr"/>
-            <a:r>
-              <a:rPr lang="en-US" sz="2400" dirty="0"/>
-              <a:t> </a:t>
-            </a:r>
-            <a:r>
-              <a:rPr lang="en-US" sz="1200" dirty="0" smtClean="0"/>
-              <a:t> </a:t>
-            </a:r>
-            <a:endParaRPr lang="en-US" sz="2400" dirty="0" smtClean="0"/>
-          </a:p>
-          <a:p>
-            <a:pPr algn="ctr"/>
-            <a:r>
-              <a:rPr lang="en-US" sz="2400" dirty="0" smtClean="0"/>
-              <a:t>DEFINITION</a:t>
-            </a:r>
-          </a:p>
-          <a:p>
-            <a:pPr algn="ctr"/>
-            <a:r>
-              <a:rPr lang="en-US" dirty="0" smtClean="0"/>
-              <a:t> </a:t>
-            </a:r>
-            <a:endParaRPr lang="en-US" sz="2400" dirty="0" smtClean="0"/>
-          </a:p>
-          <a:p>
-            <a:pPr algn="ctr"/>
-            <a:endParaRPr lang="en-US" sz="2400" dirty="0" smtClean="0"/>
-          </a:p>
-        </p:txBody>
-      </p:sp>
-      <p:sp>
-        <p:nvSpPr>
-          <p:cNvPr id="5" name="TextBox 4"/>
-          <p:cNvSpPr txBox="1"/>
-          <p:nvPr/>
-        </p:nvSpPr>
-        <p:spPr>
-          <a:xfrm>
-            <a:off x="1567541" y="1190172"/>
-            <a:ext cx="3018971" cy="461665"/>
-          </a:xfrm>
-          <a:prstGeom prst="rect">
-            <a:avLst/>
-          </a:prstGeom>
-        </p:spPr>
-        <p:style>
-          <a:lnRef idx="2">
-            <a:schemeClr val="dk1"/>
-          </a:lnRef>
-          <a:fillRef idx="1">
-            <a:schemeClr val="lt1"/>
-          </a:fillRef>
-          <a:effectRef idx="0">
-            <a:schemeClr val="dk1"/>
-          </a:effectRef>
-          <a:fontRef idx="minor">
-            <a:schemeClr val="dk1"/>
-          </a:fontRef>
-        </p:style>
-        <p:txBody>
-          <a:bodyPr wrap="square" rtlCol="0">
-            <a:spAutoFit/>
-          </a:bodyPr>
-          <a:lstStyle/>
-          <a:p>
-            <a:pPr algn="ctr"/>
-            <a:endParaRPr lang="en-US" sz="2400" dirty="0" smtClean="0"/>
+            <a:r>
+              <a:rPr lang="en-US" dirty="0"/>
+              <a:t>LOGO</a:t>
+            </a:r>
           </a:p>
         </p:txBody>
       </p:sp>
       <p:cxnSp>
         <p:nvCxnSpPr>
-          <p:cNvPr id="7" name="Straight Connector 6"/>
+          <p:cNvPr id="8" name="Straight Connector 7"/>
           <p:cNvCxnSpPr/>
           <p:nvPr/>
         </p:nvCxnSpPr>
         <p:spPr>
           <a:xfrm>
-            <a:off x="1248228" y="1190172"/>
-            <a:ext cx="3657600" cy="0"/>
+            <a:off x="7250607" y="2467429"/>
+            <a:ext cx="3294743" cy="14514"/>
           </a:xfrm>
           <a:prstGeom prst="line">
             <a:avLst/>
@@ -6084,17 +5956,14 @@
       </p:cxnSp>
       <p:cxnSp>
         <p:nvCxnSpPr>
-          <p:cNvPr id="8" name="Straight Connector 7"/>
-          <p:cNvCxnSpPr>
-            <a:stCxn id="4" idx="1"/>
-            <a:endCxn id="4" idx="3"/>
-          </p:cNvCxnSpPr>
+          <p:cNvPr id="9" name="Straight Connector 8"/>
+          <p:cNvCxnSpPr/>
           <p:nvPr/>
         </p:nvCxnSpPr>
         <p:spPr>
           <a:xfrm>
-            <a:off x="1567542" y="3773938"/>
-            <a:ext cx="3018971" cy="0"/>
+            <a:off x="7272374" y="2997199"/>
+            <a:ext cx="3294743" cy="14514"/>
           </a:xfrm>
           <a:prstGeom prst="line">
             <a:avLst/>
@@ -6115,118 +5984,16 @@
           </a:fontRef>
         </p:style>
       </p:cxnSp>
-      <p:sp>
-        <p:nvSpPr>
-          <p:cNvPr id="12" name="TextBox 11"/>
-          <p:cNvSpPr txBox="1"/>
-          <p:nvPr/>
-        </p:nvSpPr>
-        <p:spPr>
-          <a:xfrm>
-            <a:off x="1567540" y="5880647"/>
-            <a:ext cx="3018971" cy="502920"/>
-          </a:xfrm>
-          <a:prstGeom prst="rect">
-            <a:avLst/>
-          </a:prstGeom>
-        </p:spPr>
-        <p:style>
-          <a:lnRef idx="2">
-            <a:schemeClr val="dk1"/>
-          </a:lnRef>
-          <a:fillRef idx="1">
-            <a:schemeClr val="lt1"/>
-          </a:fillRef>
-          <a:effectRef idx="0">
-            <a:schemeClr val="dk1"/>
-          </a:effectRef>
-          <a:fontRef idx="minor">
-            <a:schemeClr val="dk1"/>
-          </a:fontRef>
-        </p:style>
-        <p:txBody>
-          <a:bodyPr wrap="square" rtlCol="0">
-            <a:spAutoFit/>
-          </a:bodyPr>
-          <a:lstStyle/>
-          <a:p>
-            <a:pPr algn="ctr"/>
-            <a:endParaRPr lang="en-US" sz="2400" dirty="0" smtClean="0"/>
-          </a:p>
-        </p:txBody>
-      </p:sp>
-      <p:sp>
-        <p:nvSpPr>
-          <p:cNvPr id="15" name="TextBox 14"/>
-          <p:cNvSpPr txBox="1"/>
-          <p:nvPr/>
-        </p:nvSpPr>
-        <p:spPr>
-          <a:xfrm rot="5400000">
-            <a:off x="4426647" y="646122"/>
-            <a:ext cx="496697" cy="461665"/>
-          </a:xfrm>
-          <a:prstGeom prst="rect">
-            <a:avLst/>
-          </a:prstGeom>
-          <a:noFill/>
-        </p:spPr>
-        <p:txBody>
-          <a:bodyPr wrap="square" rtlCol="0">
-            <a:spAutoFit/>
-          </a:bodyPr>
-          <a:lstStyle/>
-          <a:p>
-            <a:r>
-              <a:rPr lang="en-US" sz="2400" dirty="0" smtClean="0"/>
-              <a:t>...</a:t>
-            </a:r>
-            <a:endParaRPr lang="en-US" sz="2400" dirty="0"/>
-          </a:p>
-        </p:txBody>
-      </p:sp>
-      <p:sp>
-        <p:nvSpPr>
-          <p:cNvPr id="16" name="TextBox 15"/>
-          <p:cNvSpPr txBox="1"/>
-          <p:nvPr/>
-        </p:nvSpPr>
-        <p:spPr>
-          <a:xfrm>
-            <a:off x="1437344" y="689258"/>
-            <a:ext cx="463588" cy="369332"/>
-          </a:xfrm>
-          <a:prstGeom prst="rect">
-            <a:avLst/>
-          </a:prstGeom>
-          <a:noFill/>
-        </p:spPr>
-        <p:txBody>
-          <a:bodyPr wrap="none" rtlCol="0">
-            <a:spAutoFit/>
-          </a:bodyPr>
-          <a:lstStyle/>
-          <a:p>
-            <a:r>
-              <a:rPr lang="en-US" dirty="0" smtClean="0">
-                <a:sym typeface="Wingdings"/>
-              </a:rPr>
-              <a:t> </a:t>
-            </a:r>
-            <a:endParaRPr lang="en-US" dirty="0"/>
-          </a:p>
-        </p:txBody>
-      </p:sp>
       <p:cxnSp>
         <p:nvCxnSpPr>
-          <p:cNvPr id="17" name="Straight Connector 16"/>
+          <p:cNvPr id="10" name="Straight Connector 9"/>
           <p:cNvCxnSpPr/>
           <p:nvPr/>
         </p:nvCxnSpPr>
         <p:spPr>
           <a:xfrm>
-            <a:off x="7104742" y="1190172"/>
-            <a:ext cx="3657600" cy="0"/>
+            <a:off x="7250606" y="3521529"/>
+            <a:ext cx="3294743" cy="14514"/>
           </a:xfrm>
           <a:prstGeom prst="line">
             <a:avLst/>
@@ -6247,15 +6014,45 @@
           </a:fontRef>
         </p:style>
       </p:cxnSp>
-      <p:sp>
-        <p:nvSpPr>
-          <p:cNvPr id="18" name="TextBox 17"/>
+      <p:cxnSp>
+        <p:nvCxnSpPr>
+          <p:cNvPr id="11" name="Straight Connector 10"/>
+          <p:cNvCxnSpPr/>
+          <p:nvPr/>
+        </p:nvCxnSpPr>
+        <p:spPr>
+          <a:xfrm>
+            <a:off x="7272374" y="4106637"/>
+            <a:ext cx="3294743" cy="14514"/>
+          </a:xfrm>
+          <a:prstGeom prst="line">
+            <a:avLst/>
+          </a:prstGeom>
+        </p:spPr>
+        <p:style>
+          <a:lnRef idx="1">
+            <a:schemeClr val="dk1"/>
+          </a:lnRef>
+          <a:fillRef idx="0">
+            <a:schemeClr val="dk1"/>
+          </a:fillRef>
+          <a:effectRef idx="0">
+            <a:schemeClr val="dk1"/>
+          </a:effectRef>
+          <a:fontRef idx="minor">
+            <a:schemeClr val="tx1"/>
+          </a:fontRef>
+        </p:style>
+      </p:cxnSp>
+      <p:sp>
+        <p:nvSpPr>
+          <p:cNvPr id="12" name="TextBox 11"/>
           <p:cNvSpPr txBox="1"/>
           <p:nvPr/>
         </p:nvSpPr>
         <p:spPr>
           <a:xfrm rot="5400000">
-            <a:off x="10283161" y="646122"/>
+            <a:off x="10307135" y="774514"/>
             <a:ext cx="496697" cy="461665"/>
           </a:xfrm>
           <a:prstGeom prst="rect">
@@ -6270,23 +6067,22 @@
           <a:lstStyle/>
           <a:p>
             <a:r>
-              <a:rPr lang="en-US" sz="2400" dirty="0" smtClean="0"/>
+              <a:rPr lang="en-US" sz="2400" dirty="0"/>
               <a:t>...</a:t>
             </a:r>
-            <a:endParaRPr lang="en-US" sz="2400" dirty="0"/>
-          </a:p>
-        </p:txBody>
-      </p:sp>
-      <p:sp>
-        <p:nvSpPr>
-          <p:cNvPr id="19" name="TextBox 18"/>
+          </a:p>
+        </p:txBody>
+      </p:sp>
+      <p:sp>
+        <p:nvSpPr>
+          <p:cNvPr id="13" name="TextBox 12"/>
           <p:cNvSpPr txBox="1"/>
           <p:nvPr/>
         </p:nvSpPr>
         <p:spPr>
           <a:xfrm>
-            <a:off x="7293858" y="689258"/>
-            <a:ext cx="463588" cy="369332"/>
+            <a:off x="8271393" y="6486553"/>
+            <a:ext cx="1296702" cy="369332"/>
           </a:xfrm>
           <a:prstGeom prst="rect">
             <a:avLst/>
@@ -6300,7 +6096,732 @@
           <a:lstStyle/>
           <a:p>
             <a:r>
-              <a:rPr lang="en-US" dirty="0" smtClean="0">
+              <a:rPr lang="en-US" dirty="0"/>
+              <a:t>SUBFOLDER</a:t>
+            </a:r>
+          </a:p>
+        </p:txBody>
+      </p:sp>
+      <p:sp>
+        <p:nvSpPr>
+          <p:cNvPr id="15" name="TextBox 14"/>
+          <p:cNvSpPr txBox="1"/>
+          <p:nvPr/>
+        </p:nvSpPr>
+        <p:spPr>
+          <a:xfrm>
+            <a:off x="10214724" y="1320018"/>
+            <a:ext cx="544606" cy="584775"/>
+          </a:xfrm>
+          <a:prstGeom prst="rect">
+            <a:avLst/>
+          </a:prstGeom>
+          <a:noFill/>
+        </p:spPr>
+        <p:txBody>
+          <a:bodyPr wrap="square" rtlCol="0">
+            <a:spAutoFit/>
+          </a:bodyPr>
+          <a:lstStyle/>
+          <a:p>
+            <a:r>
+              <a:rPr lang="en-US" sz="3200" dirty="0"/>
+              <a:t>+</a:t>
+            </a:r>
+          </a:p>
+        </p:txBody>
+      </p:sp>
+      <p:sp>
+        <p:nvSpPr>
+          <p:cNvPr id="24" name="TextBox 23"/>
+          <p:cNvSpPr txBox="1"/>
+          <p:nvPr/>
+        </p:nvSpPr>
+        <p:spPr>
+          <a:xfrm>
+            <a:off x="7257456" y="1524535"/>
+            <a:ext cx="1391791" cy="369332"/>
+          </a:xfrm>
+          <a:prstGeom prst="rect">
+            <a:avLst/>
+          </a:prstGeom>
+          <a:noFill/>
+        </p:spPr>
+        <p:txBody>
+          <a:bodyPr wrap="none" rtlCol="0">
+            <a:spAutoFit/>
+          </a:bodyPr>
+          <a:lstStyle/>
+          <a:p>
+            <a:r>
+              <a:rPr lang="en-US" i="1" dirty="0"/>
+              <a:t>Folder Name</a:t>
+            </a:r>
+          </a:p>
+        </p:txBody>
+      </p:sp>
+      <p:sp>
+        <p:nvSpPr>
+          <p:cNvPr id="25" name="TextBox 24"/>
+          <p:cNvSpPr txBox="1"/>
+          <p:nvPr/>
+        </p:nvSpPr>
+        <p:spPr>
+          <a:xfrm>
+            <a:off x="7258179" y="2088214"/>
+            <a:ext cx="651525" cy="369332"/>
+          </a:xfrm>
+          <a:prstGeom prst="rect">
+            <a:avLst/>
+          </a:prstGeom>
+          <a:noFill/>
+        </p:spPr>
+        <p:txBody>
+          <a:bodyPr wrap="none" rtlCol="0">
+            <a:spAutoFit/>
+          </a:bodyPr>
+          <a:lstStyle/>
+          <a:p>
+            <a:r>
+              <a:rPr lang="en-US" dirty="0"/>
+              <a:t>Set 1</a:t>
+            </a:r>
+          </a:p>
+        </p:txBody>
+      </p:sp>
+      <p:sp>
+        <p:nvSpPr>
+          <p:cNvPr id="26" name="TextBox 25"/>
+          <p:cNvSpPr txBox="1"/>
+          <p:nvPr/>
+        </p:nvSpPr>
+        <p:spPr>
+          <a:xfrm>
+            <a:off x="7258179" y="2636897"/>
+            <a:ext cx="651525" cy="369332"/>
+          </a:xfrm>
+          <a:prstGeom prst="rect">
+            <a:avLst/>
+          </a:prstGeom>
+          <a:noFill/>
+        </p:spPr>
+        <p:txBody>
+          <a:bodyPr wrap="none" rtlCol="0">
+            <a:spAutoFit/>
+          </a:bodyPr>
+          <a:lstStyle/>
+          <a:p>
+            <a:r>
+              <a:rPr lang="en-US" dirty="0"/>
+              <a:t>Set 2</a:t>
+            </a:r>
+          </a:p>
+        </p:txBody>
+      </p:sp>
+      <p:sp>
+        <p:nvSpPr>
+          <p:cNvPr id="27" name="TextBox 26"/>
+          <p:cNvSpPr txBox="1"/>
+          <p:nvPr/>
+        </p:nvSpPr>
+        <p:spPr>
+          <a:xfrm>
+            <a:off x="7246549" y="3168561"/>
+            <a:ext cx="651525" cy="369332"/>
+          </a:xfrm>
+          <a:prstGeom prst="rect">
+            <a:avLst/>
+          </a:prstGeom>
+          <a:noFill/>
+        </p:spPr>
+        <p:txBody>
+          <a:bodyPr wrap="none" rtlCol="0">
+            <a:spAutoFit/>
+          </a:bodyPr>
+          <a:lstStyle/>
+          <a:p>
+            <a:r>
+              <a:rPr lang="en-US" dirty="0"/>
+              <a:t>Set 3</a:t>
+            </a:r>
+          </a:p>
+        </p:txBody>
+      </p:sp>
+      <p:sp>
+        <p:nvSpPr>
+          <p:cNvPr id="28" name="TextBox 27"/>
+          <p:cNvSpPr txBox="1"/>
+          <p:nvPr/>
+        </p:nvSpPr>
+        <p:spPr>
+          <a:xfrm>
+            <a:off x="7253604" y="3743732"/>
+            <a:ext cx="651525" cy="369332"/>
+          </a:xfrm>
+          <a:prstGeom prst="rect">
+            <a:avLst/>
+          </a:prstGeom>
+          <a:noFill/>
+        </p:spPr>
+        <p:txBody>
+          <a:bodyPr wrap="none" rtlCol="0">
+            <a:spAutoFit/>
+          </a:bodyPr>
+          <a:lstStyle/>
+          <a:p>
+            <a:r>
+              <a:rPr lang="en-US" dirty="0"/>
+              <a:t>Set 4</a:t>
+            </a:r>
+          </a:p>
+        </p:txBody>
+      </p:sp>
+      <p:sp>
+        <p:nvSpPr>
+          <p:cNvPr id="29" name="Frame 28"/>
+          <p:cNvSpPr/>
+          <p:nvPr/>
+        </p:nvSpPr>
+        <p:spPr>
+          <a:xfrm>
+            <a:off x="1071164" y="436389"/>
+            <a:ext cx="3657600" cy="5943600"/>
+          </a:xfrm>
+          <a:prstGeom prst="frame">
+            <a:avLst>
+              <a:gd name="adj1" fmla="val 992"/>
+            </a:avLst>
+          </a:prstGeom>
+          <a:ln/>
+        </p:spPr>
+        <p:style>
+          <a:lnRef idx="2">
+            <a:schemeClr val="dk1">
+              <a:shade val="50000"/>
+            </a:schemeClr>
+          </a:lnRef>
+          <a:fillRef idx="1">
+            <a:schemeClr val="dk1"/>
+          </a:fillRef>
+          <a:effectRef idx="0">
+            <a:schemeClr val="dk1"/>
+          </a:effectRef>
+          <a:fontRef idx="minor">
+            <a:schemeClr val="lt1"/>
+          </a:fontRef>
+        </p:style>
+        <p:txBody>
+          <a:bodyPr rtlCol="0" anchor="ctr"/>
+          <a:lstStyle/>
+          <a:p>
+            <a:pPr algn="ctr"/>
+            <a:endParaRPr lang="en-US">
+              <a:solidFill>
+                <a:schemeClr val="tx1"/>
+              </a:solidFill>
+            </a:endParaRPr>
+          </a:p>
+        </p:txBody>
+      </p:sp>
+      <p:sp>
+        <p:nvSpPr>
+          <p:cNvPr id="30" name="TextBox 29"/>
+          <p:cNvSpPr txBox="1"/>
+          <p:nvPr/>
+        </p:nvSpPr>
+        <p:spPr>
+          <a:xfrm>
+            <a:off x="2459550" y="81571"/>
+            <a:ext cx="880819" cy="369332"/>
+          </a:xfrm>
+          <a:prstGeom prst="rect">
+            <a:avLst/>
+          </a:prstGeom>
+          <a:noFill/>
+        </p:spPr>
+        <p:txBody>
+          <a:bodyPr wrap="none" rtlCol="0">
+            <a:spAutoFit/>
+          </a:bodyPr>
+          <a:lstStyle/>
+          <a:p>
+            <a:r>
+              <a:rPr lang="en-US" dirty="0"/>
+              <a:t>View_6</a:t>
+            </a:r>
+          </a:p>
+        </p:txBody>
+      </p:sp>
+      <p:cxnSp>
+        <p:nvCxnSpPr>
+          <p:cNvPr id="31" name="Straight Connector 30"/>
+          <p:cNvCxnSpPr/>
+          <p:nvPr/>
+        </p:nvCxnSpPr>
+        <p:spPr>
+          <a:xfrm>
+            <a:off x="1071160" y="1379817"/>
+            <a:ext cx="3657602" cy="0"/>
+          </a:xfrm>
+          <a:prstGeom prst="line">
+            <a:avLst/>
+          </a:prstGeom>
+        </p:spPr>
+        <p:style>
+          <a:lnRef idx="1">
+            <a:schemeClr val="dk1"/>
+          </a:lnRef>
+          <a:fillRef idx="0">
+            <a:schemeClr val="dk1"/>
+          </a:fillRef>
+          <a:effectRef idx="0">
+            <a:schemeClr val="dk1"/>
+          </a:effectRef>
+          <a:fontRef idx="minor">
+            <a:schemeClr val="tx1"/>
+          </a:fontRef>
+        </p:style>
+      </p:cxnSp>
+      <p:sp>
+        <p:nvSpPr>
+          <p:cNvPr id="32" name="TextBox 31"/>
+          <p:cNvSpPr txBox="1"/>
+          <p:nvPr/>
+        </p:nvSpPr>
+        <p:spPr>
+          <a:xfrm>
+            <a:off x="1549157" y="751462"/>
+            <a:ext cx="728020" cy="369332"/>
+          </a:xfrm>
+          <a:prstGeom prst="rect">
+            <a:avLst/>
+          </a:prstGeom>
+          <a:noFill/>
+        </p:spPr>
+        <p:txBody>
+          <a:bodyPr wrap="none" rtlCol="0">
+            <a:spAutoFit/>
+          </a:bodyPr>
+          <a:lstStyle/>
+          <a:p>
+            <a:r>
+              <a:rPr lang="en-US" dirty="0"/>
+              <a:t>LOGO</a:t>
+            </a:r>
+          </a:p>
+        </p:txBody>
+      </p:sp>
+      <p:sp>
+        <p:nvSpPr>
+          <p:cNvPr id="33" name="TextBox 32"/>
+          <p:cNvSpPr txBox="1"/>
+          <p:nvPr/>
+        </p:nvSpPr>
+        <p:spPr>
+          <a:xfrm>
+            <a:off x="3831302" y="723437"/>
+            <a:ext cx="423514" cy="553998"/>
+          </a:xfrm>
+          <a:prstGeom prst="rect">
+            <a:avLst/>
+          </a:prstGeom>
+          <a:noFill/>
+        </p:spPr>
+        <p:txBody>
+          <a:bodyPr wrap="none" rtlCol="0">
+            <a:spAutoFit/>
+          </a:bodyPr>
+          <a:lstStyle/>
+          <a:p>
+            <a:r>
+              <a:rPr lang="en-US" dirty="0"/>
+              <a:t>Q</a:t>
+            </a:r>
+          </a:p>
+          <a:p>
+            <a:r>
+              <a:rPr lang="en-US" sz="1200" dirty="0"/>
+              <a:t>B_5</a:t>
+            </a:r>
+          </a:p>
+        </p:txBody>
+      </p:sp>
+      <p:cxnSp>
+        <p:nvCxnSpPr>
+          <p:cNvPr id="34" name="Straight Connector 33"/>
+          <p:cNvCxnSpPr/>
+          <p:nvPr/>
+        </p:nvCxnSpPr>
+        <p:spPr>
+          <a:xfrm>
+            <a:off x="1230822" y="2424846"/>
+            <a:ext cx="3294743" cy="14514"/>
+          </a:xfrm>
+          <a:prstGeom prst="line">
+            <a:avLst/>
+          </a:prstGeom>
+        </p:spPr>
+        <p:style>
+          <a:lnRef idx="1">
+            <a:schemeClr val="dk1"/>
+          </a:lnRef>
+          <a:fillRef idx="0">
+            <a:schemeClr val="dk1"/>
+          </a:fillRef>
+          <a:effectRef idx="0">
+            <a:schemeClr val="dk1"/>
+          </a:effectRef>
+          <a:fontRef idx="minor">
+            <a:schemeClr val="tx1"/>
+          </a:fontRef>
+        </p:style>
+      </p:cxnSp>
+      <p:cxnSp>
+        <p:nvCxnSpPr>
+          <p:cNvPr id="35" name="Straight Connector 34"/>
+          <p:cNvCxnSpPr/>
+          <p:nvPr/>
+        </p:nvCxnSpPr>
+        <p:spPr>
+          <a:xfrm>
+            <a:off x="1252589" y="2954616"/>
+            <a:ext cx="3294743" cy="14514"/>
+          </a:xfrm>
+          <a:prstGeom prst="line">
+            <a:avLst/>
+          </a:prstGeom>
+        </p:spPr>
+        <p:style>
+          <a:lnRef idx="1">
+            <a:schemeClr val="dk1"/>
+          </a:lnRef>
+          <a:fillRef idx="0">
+            <a:schemeClr val="dk1"/>
+          </a:fillRef>
+          <a:effectRef idx="0">
+            <a:schemeClr val="dk1"/>
+          </a:effectRef>
+          <a:fontRef idx="minor">
+            <a:schemeClr val="tx1"/>
+          </a:fontRef>
+        </p:style>
+      </p:cxnSp>
+      <p:cxnSp>
+        <p:nvCxnSpPr>
+          <p:cNvPr id="36" name="Straight Connector 35"/>
+          <p:cNvCxnSpPr/>
+          <p:nvPr/>
+        </p:nvCxnSpPr>
+        <p:spPr>
+          <a:xfrm>
+            <a:off x="1230821" y="3478946"/>
+            <a:ext cx="3294743" cy="14514"/>
+          </a:xfrm>
+          <a:prstGeom prst="line">
+            <a:avLst/>
+          </a:prstGeom>
+        </p:spPr>
+        <p:style>
+          <a:lnRef idx="1">
+            <a:schemeClr val="dk1"/>
+          </a:lnRef>
+          <a:fillRef idx="0">
+            <a:schemeClr val="dk1"/>
+          </a:fillRef>
+          <a:effectRef idx="0">
+            <a:schemeClr val="dk1"/>
+          </a:effectRef>
+          <a:fontRef idx="minor">
+            <a:schemeClr val="tx1"/>
+          </a:fontRef>
+        </p:style>
+      </p:cxnSp>
+      <p:cxnSp>
+        <p:nvCxnSpPr>
+          <p:cNvPr id="37" name="Straight Connector 36"/>
+          <p:cNvCxnSpPr/>
+          <p:nvPr/>
+        </p:nvCxnSpPr>
+        <p:spPr>
+          <a:xfrm>
+            <a:off x="1252589" y="4064054"/>
+            <a:ext cx="3294743" cy="14514"/>
+          </a:xfrm>
+          <a:prstGeom prst="line">
+            <a:avLst/>
+          </a:prstGeom>
+        </p:spPr>
+        <p:style>
+          <a:lnRef idx="1">
+            <a:schemeClr val="dk1"/>
+          </a:lnRef>
+          <a:fillRef idx="0">
+            <a:schemeClr val="dk1"/>
+          </a:fillRef>
+          <a:effectRef idx="0">
+            <a:schemeClr val="dk1"/>
+          </a:effectRef>
+          <a:fontRef idx="minor">
+            <a:schemeClr val="tx1"/>
+          </a:fontRef>
+        </p:style>
+      </p:cxnSp>
+      <p:sp>
+        <p:nvSpPr>
+          <p:cNvPr id="38" name="TextBox 37"/>
+          <p:cNvSpPr txBox="1"/>
+          <p:nvPr/>
+        </p:nvSpPr>
+        <p:spPr>
+          <a:xfrm rot="5400000">
+            <a:off x="4287350" y="731931"/>
+            <a:ext cx="496697" cy="461665"/>
+          </a:xfrm>
+          <a:prstGeom prst="rect">
+            <a:avLst/>
+          </a:prstGeom>
+          <a:noFill/>
+        </p:spPr>
+        <p:txBody>
+          <a:bodyPr wrap="square" rtlCol="0">
+            <a:spAutoFit/>
+          </a:bodyPr>
+          <a:lstStyle/>
+          <a:p>
+            <a:r>
+              <a:rPr lang="en-US" sz="2400" dirty="0"/>
+              <a:t>...</a:t>
+            </a:r>
+          </a:p>
+        </p:txBody>
+      </p:sp>
+      <p:sp>
+        <p:nvSpPr>
+          <p:cNvPr id="39" name="TextBox 38"/>
+          <p:cNvSpPr txBox="1"/>
+          <p:nvPr/>
+        </p:nvSpPr>
+        <p:spPr>
+          <a:xfrm>
+            <a:off x="2229841" y="6378944"/>
+            <a:ext cx="918393" cy="369332"/>
+          </a:xfrm>
+          <a:prstGeom prst="rect">
+            <a:avLst/>
+          </a:prstGeom>
+          <a:noFill/>
+        </p:spPr>
+        <p:txBody>
+          <a:bodyPr wrap="none" rtlCol="0">
+            <a:spAutoFit/>
+          </a:bodyPr>
+          <a:lstStyle/>
+          <a:p>
+            <a:r>
+              <a:rPr lang="en-US" dirty="0"/>
+              <a:t>FOLDER</a:t>
+            </a:r>
+          </a:p>
+        </p:txBody>
+      </p:sp>
+      <p:sp>
+        <p:nvSpPr>
+          <p:cNvPr id="40" name="TextBox 39"/>
+          <p:cNvSpPr txBox="1"/>
+          <p:nvPr/>
+        </p:nvSpPr>
+        <p:spPr>
+          <a:xfrm>
+            <a:off x="4194939" y="1277435"/>
+            <a:ext cx="544606" cy="584775"/>
+          </a:xfrm>
+          <a:prstGeom prst="rect">
+            <a:avLst/>
+          </a:prstGeom>
+          <a:noFill/>
+        </p:spPr>
+        <p:txBody>
+          <a:bodyPr wrap="square" rtlCol="0">
+            <a:spAutoFit/>
+          </a:bodyPr>
+          <a:lstStyle/>
+          <a:p>
+            <a:r>
+              <a:rPr lang="en-US" sz="3200" dirty="0"/>
+              <a:t>+</a:t>
+            </a:r>
+          </a:p>
+        </p:txBody>
+      </p:sp>
+      <p:sp>
+        <p:nvSpPr>
+          <p:cNvPr id="41" name="TextBox 40"/>
+          <p:cNvSpPr txBox="1"/>
+          <p:nvPr/>
+        </p:nvSpPr>
+        <p:spPr>
+          <a:xfrm>
+            <a:off x="1230821" y="1499815"/>
+            <a:ext cx="1225015" cy="369332"/>
+          </a:xfrm>
+          <a:prstGeom prst="rect">
+            <a:avLst/>
+          </a:prstGeom>
+          <a:noFill/>
+        </p:spPr>
+        <p:txBody>
+          <a:bodyPr wrap="none" rtlCol="0">
+            <a:spAutoFit/>
+          </a:bodyPr>
+          <a:lstStyle/>
+          <a:p>
+            <a:r>
+              <a:rPr lang="en-US" i="1" dirty="0"/>
+              <a:t>User Name</a:t>
+            </a:r>
+          </a:p>
+        </p:txBody>
+      </p:sp>
+      <p:sp>
+        <p:nvSpPr>
+          <p:cNvPr id="42" name="TextBox 41"/>
+          <p:cNvSpPr txBox="1"/>
+          <p:nvPr/>
+        </p:nvSpPr>
+        <p:spPr>
+          <a:xfrm>
+            <a:off x="1238394" y="2045631"/>
+            <a:ext cx="949362" cy="369332"/>
+          </a:xfrm>
+          <a:prstGeom prst="rect">
+            <a:avLst/>
+          </a:prstGeom>
+          <a:noFill/>
+        </p:spPr>
+        <p:txBody>
+          <a:bodyPr wrap="none" rtlCol="0">
+            <a:spAutoFit/>
+          </a:bodyPr>
+          <a:lstStyle/>
+          <a:p>
+            <a:r>
+              <a:rPr lang="en-US" dirty="0"/>
+              <a:t>Folder 1</a:t>
+            </a:r>
+          </a:p>
+        </p:txBody>
+      </p:sp>
+      <p:sp>
+        <p:nvSpPr>
+          <p:cNvPr id="43" name="TextBox 42"/>
+          <p:cNvSpPr txBox="1"/>
+          <p:nvPr/>
+        </p:nvSpPr>
+        <p:spPr>
+          <a:xfrm>
+            <a:off x="1238394" y="2594314"/>
+            <a:ext cx="949362" cy="369332"/>
+          </a:xfrm>
+          <a:prstGeom prst="rect">
+            <a:avLst/>
+          </a:prstGeom>
+          <a:noFill/>
+        </p:spPr>
+        <p:txBody>
+          <a:bodyPr wrap="none" rtlCol="0">
+            <a:spAutoFit/>
+          </a:bodyPr>
+          <a:lstStyle/>
+          <a:p>
+            <a:r>
+              <a:rPr lang="en-US" dirty="0"/>
+              <a:t>Folder 2</a:t>
+            </a:r>
+          </a:p>
+        </p:txBody>
+      </p:sp>
+      <p:sp>
+        <p:nvSpPr>
+          <p:cNvPr id="44" name="TextBox 43"/>
+          <p:cNvSpPr txBox="1"/>
+          <p:nvPr/>
+        </p:nvSpPr>
+        <p:spPr>
+          <a:xfrm>
+            <a:off x="1226764" y="3125978"/>
+            <a:ext cx="949362" cy="369332"/>
+          </a:xfrm>
+          <a:prstGeom prst="rect">
+            <a:avLst/>
+          </a:prstGeom>
+          <a:noFill/>
+        </p:spPr>
+        <p:txBody>
+          <a:bodyPr wrap="none" rtlCol="0">
+            <a:spAutoFit/>
+          </a:bodyPr>
+          <a:lstStyle/>
+          <a:p>
+            <a:r>
+              <a:rPr lang="en-US" dirty="0"/>
+              <a:t>Folder 3</a:t>
+            </a:r>
+          </a:p>
+        </p:txBody>
+      </p:sp>
+      <p:sp>
+        <p:nvSpPr>
+          <p:cNvPr id="45" name="TextBox 44"/>
+          <p:cNvSpPr txBox="1"/>
+          <p:nvPr/>
+        </p:nvSpPr>
+        <p:spPr>
+          <a:xfrm>
+            <a:off x="1233819" y="3701149"/>
+            <a:ext cx="949362" cy="369332"/>
+          </a:xfrm>
+          <a:prstGeom prst="rect">
+            <a:avLst/>
+          </a:prstGeom>
+          <a:noFill/>
+        </p:spPr>
+        <p:txBody>
+          <a:bodyPr wrap="none" rtlCol="0">
+            <a:spAutoFit/>
+          </a:bodyPr>
+          <a:lstStyle/>
+          <a:p>
+            <a:r>
+              <a:rPr lang="en-US" dirty="0"/>
+              <a:t>Folder 4</a:t>
+            </a:r>
+          </a:p>
+        </p:txBody>
+      </p:sp>
+      <p:sp>
+        <p:nvSpPr>
+          <p:cNvPr id="46" name="TextBox 45"/>
+          <p:cNvSpPr txBox="1"/>
+          <p:nvPr/>
+        </p:nvSpPr>
+        <p:spPr>
+          <a:xfrm>
+            <a:off x="7128716" y="798244"/>
+            <a:ext cx="463588" cy="369332"/>
+          </a:xfrm>
+          <a:prstGeom prst="rect">
+            <a:avLst/>
+          </a:prstGeom>
+          <a:noFill/>
+        </p:spPr>
+        <p:txBody>
+          <a:bodyPr wrap="none" rtlCol="0">
+            <a:spAutoFit/>
+          </a:bodyPr>
+          <a:lstStyle/>
+          <a:p>
+            <a:r>
+              <a:rPr lang="en-US" dirty="0">
                 <a:sym typeface="Wingdings"/>
               </a:rPr>
               <a:t> </a:t>
@@ -6311,141 +6832,14 @@
       </p:sp>
       <p:sp>
         <p:nvSpPr>
-          <p:cNvPr id="21" name="TextBox 20"/>
+          <p:cNvPr id="47" name="TextBox 46"/>
           <p:cNvSpPr txBox="1"/>
           <p:nvPr/>
         </p:nvSpPr>
         <p:spPr>
           <a:xfrm>
-            <a:off x="8072546" y="2404533"/>
-            <a:ext cx="1721990" cy="461665"/>
-          </a:xfrm>
-          <a:prstGeom prst="rect">
-            <a:avLst/>
-          </a:prstGeom>
-          <a:noFill/>
-        </p:spPr>
-        <p:txBody>
-          <a:bodyPr wrap="square" rtlCol="0">
-            <a:spAutoFit/>
-          </a:bodyPr>
-          <a:lstStyle/>
-          <a:p>
-            <a:pPr algn="ctr"/>
-            <a:r>
-              <a:rPr lang="en-US" sz="2400" dirty="0" smtClean="0"/>
-              <a:t>DEFINITION</a:t>
-            </a:r>
-            <a:endParaRPr lang="en-US" sz="2400" dirty="0"/>
-          </a:p>
-        </p:txBody>
-      </p:sp>
-      <p:sp>
-        <p:nvSpPr>
-          <p:cNvPr id="22" name="TextBox 21"/>
-          <p:cNvSpPr txBox="1"/>
-          <p:nvPr/>
-        </p:nvSpPr>
-        <p:spPr>
-          <a:xfrm>
-            <a:off x="7314716" y="3826989"/>
-            <a:ext cx="3237651" cy="923330"/>
-          </a:xfrm>
-          <a:prstGeom prst="rect">
-            <a:avLst/>
-          </a:prstGeom>
-          <a:noFill/>
-          <a:ln>
-            <a:solidFill>
-              <a:schemeClr val="bg1">
-                <a:lumMod val="50000"/>
-              </a:schemeClr>
-            </a:solidFill>
-          </a:ln>
-        </p:spPr>
-        <p:txBody>
-          <a:bodyPr wrap="square" rtlCol="0">
-            <a:spAutoFit/>
-          </a:bodyPr>
-          <a:lstStyle/>
-          <a:p>
-            <a:endParaRPr lang="en-US" dirty="0" smtClean="0">
-              <a:solidFill>
-                <a:schemeClr val="bg1">
-                  <a:lumMod val="50000"/>
-                </a:schemeClr>
-              </a:solidFill>
-            </a:endParaRPr>
-          </a:p>
-          <a:p>
-            <a:r>
-              <a:rPr lang="en-US" dirty="0" smtClean="0">
-                <a:solidFill>
-                  <a:schemeClr val="bg1">
-                    <a:lumMod val="50000"/>
-                  </a:schemeClr>
-                </a:solidFill>
-              </a:rPr>
-              <a:t>Type Answer</a:t>
-            </a:r>
-          </a:p>
-          <a:p>
-            <a:endParaRPr lang="en-US" dirty="0">
-              <a:solidFill>
-                <a:schemeClr val="bg1">
-                  <a:lumMod val="50000"/>
-                </a:schemeClr>
-              </a:solidFill>
-            </a:endParaRPr>
-          </a:p>
-        </p:txBody>
-      </p:sp>
-      <p:sp>
-        <p:nvSpPr>
-          <p:cNvPr id="23" name="TextBox 22"/>
-          <p:cNvSpPr txBox="1"/>
-          <p:nvPr/>
-        </p:nvSpPr>
-        <p:spPr>
-          <a:xfrm>
-            <a:off x="9736663" y="4001906"/>
-            <a:ext cx="733344" cy="584775"/>
-          </a:xfrm>
-          <a:prstGeom prst="rect">
-            <a:avLst/>
-          </a:prstGeom>
-          <a:noFill/>
-          <a:ln>
-            <a:solidFill>
-              <a:schemeClr val="tx1"/>
-            </a:solidFill>
-          </a:ln>
-        </p:spPr>
-        <p:txBody>
-          <a:bodyPr wrap="square" rtlCol="0" anchor="ctr" anchorCtr="0">
-            <a:spAutoFit/>
-          </a:bodyPr>
-          <a:lstStyle/>
-          <a:p>
-            <a:pPr algn="ctr"/>
-            <a:r>
-              <a:rPr lang="en-US" sz="1600" dirty="0" smtClean="0"/>
-              <a:t>Don’t Know</a:t>
-            </a:r>
-            <a:endParaRPr lang="en-US" sz="1600" dirty="0"/>
-          </a:p>
-        </p:txBody>
-      </p:sp>
-      <p:sp>
-        <p:nvSpPr>
-          <p:cNvPr id="20" name="TextBox 19"/>
-          <p:cNvSpPr txBox="1"/>
-          <p:nvPr/>
-        </p:nvSpPr>
-        <p:spPr>
-          <a:xfrm>
-            <a:off x="2636490" y="124154"/>
-            <a:ext cx="881075" cy="369332"/>
+            <a:off x="1108931" y="778097"/>
+            <a:ext cx="463588" cy="369332"/>
           </a:xfrm>
           <a:prstGeom prst="rect">
             <a:avLst/>
@@ -6459,98 +6853,10 @@
           <a:lstStyle/>
           <a:p>
             <a:r>
-              <a:rPr lang="en-US" dirty="0" smtClean="0"/>
-              <a:t>View_6</a:t>
-            </a:r>
-            <a:endParaRPr lang="en-US" dirty="0"/>
-          </a:p>
-        </p:txBody>
-      </p:sp>
-      <p:sp>
-        <p:nvSpPr>
-          <p:cNvPr id="24" name="TextBox 23"/>
-          <p:cNvSpPr txBox="1"/>
-          <p:nvPr/>
-        </p:nvSpPr>
-        <p:spPr>
-          <a:xfrm>
-            <a:off x="8493003" y="129775"/>
-            <a:ext cx="881075" cy="369332"/>
-          </a:xfrm>
-          <a:prstGeom prst="rect">
-            <a:avLst/>
-          </a:prstGeom>
-          <a:noFill/>
-        </p:spPr>
-        <p:txBody>
-          <a:bodyPr wrap="none" rtlCol="0">
-            <a:spAutoFit/>
-          </a:bodyPr>
-          <a:lstStyle/>
-          <a:p>
-            <a:r>
-              <a:rPr lang="en-US" dirty="0" smtClean="0"/>
-              <a:t>View_7</a:t>
-            </a:r>
-            <a:endParaRPr lang="en-US" dirty="0"/>
-          </a:p>
-        </p:txBody>
-      </p:sp>
-      <p:sp>
-        <p:nvSpPr>
-          <p:cNvPr id="26" name="TextBox 25"/>
-          <p:cNvSpPr txBox="1"/>
-          <p:nvPr/>
-        </p:nvSpPr>
-        <p:spPr>
-          <a:xfrm>
-            <a:off x="8728529" y="6511988"/>
-            <a:ext cx="813043" cy="369332"/>
-          </a:xfrm>
-          <a:prstGeom prst="rect">
-            <a:avLst/>
-          </a:prstGeom>
-          <a:noFill/>
-        </p:spPr>
-        <p:txBody>
-          <a:bodyPr wrap="none" rtlCol="0">
-            <a:spAutoFit/>
-          </a:bodyPr>
-          <a:lstStyle/>
-          <a:p>
-            <a:r>
-              <a:rPr lang="en-US" dirty="0" smtClean="0"/>
-              <a:t>WORD</a:t>
-            </a:r>
-            <a:endParaRPr lang="en-US" dirty="0"/>
-          </a:p>
-        </p:txBody>
-      </p:sp>
-      <p:sp>
-        <p:nvSpPr>
-          <p:cNvPr id="27" name="TextBox 26"/>
-          <p:cNvSpPr txBox="1"/>
-          <p:nvPr/>
-        </p:nvSpPr>
-        <p:spPr>
-          <a:xfrm>
-            <a:off x="2636490" y="6469681"/>
-            <a:ext cx="1361370" cy="369332"/>
-          </a:xfrm>
-          <a:prstGeom prst="rect">
-            <a:avLst/>
-          </a:prstGeom>
-          <a:noFill/>
-        </p:spPr>
-        <p:txBody>
-          <a:bodyPr wrap="none" rtlCol="0">
-            <a:spAutoFit/>
-          </a:bodyPr>
-          <a:lstStyle/>
-          <a:p>
-            <a:r>
-              <a:rPr lang="en-US" smtClean="0"/>
-              <a:t>WORDBOOK</a:t>
+              <a:rPr lang="en-US" dirty="0">
+                <a:sym typeface="Wingdings"/>
+              </a:rPr>
+              <a:t> </a:t>
             </a:r>
             <a:endParaRPr lang="en-US" dirty="0"/>
           </a:p>
@@ -6559,7 +6865,7 @@
     </p:spTree>
     <p:extLst>
       <p:ext uri="{BB962C8B-B14F-4D97-AF65-F5344CB8AC3E}">
-        <p14:creationId xmlns:p14="http://schemas.microsoft.com/office/powerpoint/2010/main" val="576644425"/>
+        <p14:creationId xmlns:p14="http://schemas.microsoft.com/office/powerpoint/2010/main" val="580768532"/>
       </p:ext>
     </p:extLst>
   </p:cSld>
@@ -6588,7 +6894,7 @@
       </p:grpSpPr>
       <p:sp>
         <p:nvSpPr>
-          <p:cNvPr id="6" name="Frame 5"/>
+          <p:cNvPr id="2" name="Frame 1"/>
           <p:cNvSpPr/>
           <p:nvPr/>
         </p:nvSpPr>
@@ -6635,7 +6941,7 @@
       </p:sp>
       <p:sp>
         <p:nvSpPr>
-          <p:cNvPr id="7" name="Frame 6"/>
+          <p:cNvPr id="3" name="Frame 2"/>
           <p:cNvSpPr/>
           <p:nvPr/>
         </p:nvSpPr>
@@ -6680,9 +6986,146 @@
           </a:p>
         </p:txBody>
       </p:sp>
+      <p:sp>
+        <p:nvSpPr>
+          <p:cNvPr id="4" name="TextBox 3"/>
+          <p:cNvSpPr txBox="1"/>
+          <p:nvPr/>
+        </p:nvSpPr>
+        <p:spPr>
+          <a:xfrm>
+            <a:off x="1567542" y="2111944"/>
+            <a:ext cx="3018971" cy="3323987"/>
+          </a:xfrm>
+          <a:prstGeom prst="rect">
+            <a:avLst/>
+          </a:prstGeom>
+        </p:spPr>
+        <p:style>
+          <a:lnRef idx="2">
+            <a:schemeClr val="dk1"/>
+          </a:lnRef>
+          <a:fillRef idx="1">
+            <a:schemeClr val="lt1"/>
+          </a:fillRef>
+          <a:effectRef idx="0">
+            <a:schemeClr val="dk1"/>
+          </a:effectRef>
+          <a:fontRef idx="minor">
+            <a:schemeClr val="dk1"/>
+          </a:fontRef>
+        </p:style>
+        <p:txBody>
+          <a:bodyPr wrap="square" rtlCol="0">
+            <a:spAutoFit/>
+          </a:bodyPr>
+          <a:lstStyle/>
+          <a:p>
+            <a:pPr algn="ctr"/>
+            <a:endParaRPr lang="en-US" sz="2400" dirty="0"/>
+          </a:p>
+          <a:p>
+            <a:pPr algn="ctr"/>
+            <a:endParaRPr lang="en-US" sz="2400" dirty="0"/>
+          </a:p>
+          <a:p>
+            <a:pPr algn="ctr"/>
+            <a:r>
+              <a:rPr lang="en-US" sz="2400" dirty="0"/>
+              <a:t>WORD</a:t>
+            </a:r>
+          </a:p>
+          <a:p>
+            <a:pPr algn="ctr"/>
+            <a:r>
+              <a:rPr lang="en-US" sz="1200" dirty="0"/>
+              <a:t> </a:t>
+            </a:r>
+            <a:r>
+              <a:rPr lang="en-US" sz="2400" dirty="0"/>
+              <a:t> </a:t>
+            </a:r>
+          </a:p>
+          <a:p>
+            <a:pPr algn="ctr"/>
+            <a:endParaRPr lang="en-US" sz="2400" dirty="0"/>
+          </a:p>
+          <a:p>
+            <a:pPr algn="ctr"/>
+            <a:r>
+              <a:rPr lang="en-US" sz="2400" dirty="0"/>
+              <a:t> </a:t>
+            </a:r>
+            <a:r>
+              <a:rPr lang="en-US" sz="1200" dirty="0"/>
+              <a:t> </a:t>
+            </a:r>
+            <a:endParaRPr lang="en-US" sz="2400" dirty="0"/>
+          </a:p>
+          <a:p>
+            <a:pPr algn="ctr"/>
+            <a:r>
+              <a:rPr lang="en-US" sz="2400" dirty="0"/>
+              <a:t>DEFINITION</a:t>
+            </a:r>
+          </a:p>
+          <a:p>
+            <a:pPr algn="ctr"/>
+            <a:r>
+              <a:rPr lang="en-US" dirty="0"/>
+              <a:t> </a:t>
+            </a:r>
+            <a:endParaRPr lang="en-US" sz="2400" dirty="0"/>
+          </a:p>
+          <a:p>
+            <a:pPr algn="ctr"/>
+            <a:endParaRPr lang="en-US" sz="2400" dirty="0"/>
+          </a:p>
+        </p:txBody>
+      </p:sp>
+      <p:sp>
+        <p:nvSpPr>
+          <p:cNvPr id="5" name="TextBox 4"/>
+          <p:cNvSpPr txBox="1"/>
+          <p:nvPr/>
+        </p:nvSpPr>
+        <p:spPr>
+          <a:xfrm>
+            <a:off x="1567541" y="1190172"/>
+            <a:ext cx="3018971" cy="461665"/>
+          </a:xfrm>
+          <a:prstGeom prst="rect">
+            <a:avLst/>
+          </a:prstGeom>
+        </p:spPr>
+        <p:style>
+          <a:lnRef idx="2">
+            <a:schemeClr val="dk1"/>
+          </a:lnRef>
+          <a:fillRef idx="1">
+            <a:schemeClr val="lt1"/>
+          </a:fillRef>
+          <a:effectRef idx="0">
+            <a:schemeClr val="dk1"/>
+          </a:effectRef>
+          <a:fontRef idx="minor">
+            <a:schemeClr val="dk1"/>
+          </a:fontRef>
+        </p:style>
+        <p:txBody>
+          <a:bodyPr wrap="square" rtlCol="0">
+            <a:spAutoFit/>
+          </a:bodyPr>
+          <a:lstStyle/>
+          <a:p>
+            <a:pPr algn="ctr"/>
+            <a:endParaRPr lang="en-US" sz="2400" dirty="0"/>
+          </a:p>
+        </p:txBody>
+      </p:sp>
       <p:cxnSp>
         <p:nvCxnSpPr>
-          <p:cNvPr id="8" name="Straight Connector 7"/>
+          <p:cNvPr id="7" name="Straight Connector 6"/>
           <p:cNvCxnSpPr/>
           <p:nvPr/>
         </p:nvCxnSpPr>
@@ -6710,78 +7153,19 @@
           </a:fontRef>
         </p:style>
       </p:cxnSp>
-      <p:sp>
-        <p:nvSpPr>
-          <p:cNvPr id="9" name="TextBox 8"/>
-          <p:cNvSpPr txBox="1"/>
-          <p:nvPr/>
-        </p:nvSpPr>
-        <p:spPr>
-          <a:xfrm rot="5400000">
-            <a:off x="4426647" y="646122"/>
-            <a:ext cx="496697" cy="461665"/>
-          </a:xfrm>
-          <a:prstGeom prst="rect">
-            <a:avLst/>
-          </a:prstGeom>
-          <a:noFill/>
-        </p:spPr>
-        <p:txBody>
-          <a:bodyPr wrap="square" rtlCol="0">
-            <a:spAutoFit/>
-          </a:bodyPr>
-          <a:lstStyle/>
-          <a:p>
-            <a:r>
-              <a:rPr lang="en-US" sz="2400" dirty="0" smtClean="0"/>
-              <a:t>...</a:t>
-            </a:r>
-            <a:endParaRPr lang="en-US" sz="2400" dirty="0"/>
-          </a:p>
-        </p:txBody>
-      </p:sp>
-      <p:sp>
-        <p:nvSpPr>
-          <p:cNvPr id="10" name="TextBox 9"/>
-          <p:cNvSpPr txBox="1"/>
-          <p:nvPr/>
-        </p:nvSpPr>
-        <p:spPr>
-          <a:xfrm>
-            <a:off x="1437344" y="689258"/>
-            <a:ext cx="463588" cy="369332"/>
-          </a:xfrm>
-          <a:prstGeom prst="rect">
-            <a:avLst/>
-          </a:prstGeom>
-          <a:noFill/>
-        </p:spPr>
-        <p:txBody>
-          <a:bodyPr wrap="none" rtlCol="0">
-            <a:spAutoFit/>
-          </a:bodyPr>
-          <a:lstStyle/>
-          <a:p>
-            <a:r>
-              <a:rPr lang="en-US" dirty="0" smtClean="0">
-                <a:sym typeface="Wingdings"/>
-              </a:rPr>
-              <a:t> </a:t>
-            </a:r>
-            <a:endParaRPr lang="en-US" dirty="0"/>
-          </a:p>
-        </p:txBody>
-      </p:sp>
       <p:cxnSp>
         <p:nvCxnSpPr>
-          <p:cNvPr id="11" name="Straight Connector 10"/>
-          <p:cNvCxnSpPr/>
+          <p:cNvPr id="8" name="Straight Connector 7"/>
+          <p:cNvCxnSpPr>
+            <a:stCxn id="4" idx="1"/>
+            <a:endCxn id="4" idx="3"/>
+          </p:cNvCxnSpPr>
           <p:nvPr/>
         </p:nvCxnSpPr>
         <p:spPr>
           <a:xfrm>
-            <a:off x="7104742" y="1190172"/>
-            <a:ext cx="3657600" cy="0"/>
+            <a:off x="1567542" y="3773938"/>
+            <a:ext cx="3018971" cy="0"/>
           </a:xfrm>
           <a:prstGeom prst="line">
             <a:avLst/>
@@ -6804,13 +7188,82 @@
       </p:cxnSp>
       <p:sp>
         <p:nvSpPr>
-          <p:cNvPr id="13" name="TextBox 12"/>
+          <p:cNvPr id="12" name="TextBox 11"/>
           <p:cNvSpPr txBox="1"/>
           <p:nvPr/>
         </p:nvSpPr>
         <p:spPr>
           <a:xfrm>
-            <a:off x="7293858" y="689258"/>
+            <a:off x="1567540" y="5880647"/>
+            <a:ext cx="3018971" cy="502920"/>
+          </a:xfrm>
+          <a:prstGeom prst="rect">
+            <a:avLst/>
+          </a:prstGeom>
+        </p:spPr>
+        <p:style>
+          <a:lnRef idx="2">
+            <a:schemeClr val="dk1"/>
+          </a:lnRef>
+          <a:fillRef idx="1">
+            <a:schemeClr val="lt1"/>
+          </a:fillRef>
+          <a:effectRef idx="0">
+            <a:schemeClr val="dk1"/>
+          </a:effectRef>
+          <a:fontRef idx="minor">
+            <a:schemeClr val="dk1"/>
+          </a:fontRef>
+        </p:style>
+        <p:txBody>
+          <a:bodyPr wrap="square" rtlCol="0">
+            <a:spAutoFit/>
+          </a:bodyPr>
+          <a:lstStyle/>
+          <a:p>
+            <a:pPr algn="ctr"/>
+            <a:endParaRPr lang="en-US" sz="2400" dirty="0"/>
+          </a:p>
+        </p:txBody>
+      </p:sp>
+      <p:sp>
+        <p:nvSpPr>
+          <p:cNvPr id="15" name="TextBox 14"/>
+          <p:cNvSpPr txBox="1"/>
+          <p:nvPr/>
+        </p:nvSpPr>
+        <p:spPr>
+          <a:xfrm rot="5400000">
+            <a:off x="4426647" y="646122"/>
+            <a:ext cx="496697" cy="461665"/>
+          </a:xfrm>
+          <a:prstGeom prst="rect">
+            <a:avLst/>
+          </a:prstGeom>
+          <a:noFill/>
+        </p:spPr>
+        <p:txBody>
+          <a:bodyPr wrap="square" rtlCol="0">
+            <a:spAutoFit/>
+          </a:bodyPr>
+          <a:lstStyle/>
+          <a:p>
+            <a:r>
+              <a:rPr lang="en-US" sz="2400" dirty="0"/>
+              <a:t>...</a:t>
+            </a:r>
+          </a:p>
+        </p:txBody>
+      </p:sp>
+      <p:sp>
+        <p:nvSpPr>
+          <p:cNvPr id="16" name="TextBox 15"/>
+          <p:cNvSpPr txBox="1"/>
+          <p:nvPr/>
+        </p:nvSpPr>
+        <p:spPr>
+          <a:xfrm>
+            <a:off x="1437344" y="689258"/>
             <a:ext cx="463588" cy="369332"/>
           </a:xfrm>
           <a:prstGeom prst="rect">
@@ -6825,7 +7278,7 @@
           <a:lstStyle/>
           <a:p>
             <a:r>
-              <a:rPr lang="en-US" dirty="0" smtClean="0">
+              <a:rPr lang="en-US" dirty="0">
                 <a:sym typeface="Wingdings"/>
               </a:rPr>
               <a:t> </a:t>
@@ -6834,16 +7287,75 @@
           </a:p>
         </p:txBody>
       </p:sp>
-      <p:sp>
-        <p:nvSpPr>
-          <p:cNvPr id="14" name="TextBox 13"/>
+      <p:cxnSp>
+        <p:nvCxnSpPr>
+          <p:cNvPr id="17" name="Straight Connector 16"/>
+          <p:cNvCxnSpPr/>
+          <p:nvPr/>
+        </p:nvCxnSpPr>
+        <p:spPr>
+          <a:xfrm>
+            <a:off x="7104742" y="1190172"/>
+            <a:ext cx="3657600" cy="0"/>
+          </a:xfrm>
+          <a:prstGeom prst="line">
+            <a:avLst/>
+          </a:prstGeom>
+        </p:spPr>
+        <p:style>
+          <a:lnRef idx="1">
+            <a:schemeClr val="dk1"/>
+          </a:lnRef>
+          <a:fillRef idx="0">
+            <a:schemeClr val="dk1"/>
+          </a:fillRef>
+          <a:effectRef idx="0">
+            <a:schemeClr val="dk1"/>
+          </a:effectRef>
+          <a:fontRef idx="minor">
+            <a:schemeClr val="tx1"/>
+          </a:fontRef>
+        </p:style>
+      </p:cxnSp>
+      <p:sp>
+        <p:nvSpPr>
+          <p:cNvPr id="18" name="TextBox 17"/>
           <p:cNvSpPr txBox="1"/>
           <p:nvPr/>
         </p:nvSpPr>
         <p:spPr>
-          <a:xfrm>
-            <a:off x="2636490" y="124154"/>
-            <a:ext cx="881075" cy="369332"/>
+          <a:xfrm rot="5400000">
+            <a:off x="10283161" y="646122"/>
+            <a:ext cx="496697" cy="461665"/>
+          </a:xfrm>
+          <a:prstGeom prst="rect">
+            <a:avLst/>
+          </a:prstGeom>
+          <a:noFill/>
+        </p:spPr>
+        <p:txBody>
+          <a:bodyPr wrap="square" rtlCol="0">
+            <a:spAutoFit/>
+          </a:bodyPr>
+          <a:lstStyle/>
+          <a:p>
+            <a:r>
+              <a:rPr lang="en-US" sz="2400" dirty="0"/>
+              <a:t>...</a:t>
+            </a:r>
+          </a:p>
+        </p:txBody>
+      </p:sp>
+      <p:sp>
+        <p:nvSpPr>
+          <p:cNvPr id="19" name="TextBox 18"/>
+          <p:cNvSpPr txBox="1"/>
+          <p:nvPr/>
+        </p:nvSpPr>
+        <p:spPr>
+          <a:xfrm>
+            <a:off x="7293858" y="689258"/>
+            <a:ext cx="463588" cy="369332"/>
           </a:xfrm>
           <a:prstGeom prst="rect">
             <a:avLst/>
@@ -6857,8 +7369,10 @@
           <a:lstStyle/>
           <a:p>
             <a:r>
-              <a:rPr lang="en-US" dirty="0" smtClean="0"/>
-              <a:t>View_8</a:t>
+              <a:rPr lang="en-US" dirty="0">
+                <a:sym typeface="Wingdings"/>
+              </a:rPr>
+              <a:t> </a:t>
             </a:r>
             <a:endParaRPr lang="en-US" dirty="0"/>
           </a:p>
@@ -6866,13 +7380,138 @@
       </p:sp>
       <p:sp>
         <p:nvSpPr>
-          <p:cNvPr id="15" name="TextBox 14"/>
+          <p:cNvPr id="21" name="TextBox 20"/>
           <p:cNvSpPr txBox="1"/>
           <p:nvPr/>
         </p:nvSpPr>
         <p:spPr>
           <a:xfrm>
-            <a:off x="8493003" y="129775"/>
+            <a:off x="8072546" y="2404533"/>
+            <a:ext cx="1721990" cy="461665"/>
+          </a:xfrm>
+          <a:prstGeom prst="rect">
+            <a:avLst/>
+          </a:prstGeom>
+          <a:noFill/>
+        </p:spPr>
+        <p:txBody>
+          <a:bodyPr wrap="square" rtlCol="0">
+            <a:spAutoFit/>
+          </a:bodyPr>
+          <a:lstStyle/>
+          <a:p>
+            <a:pPr algn="ctr"/>
+            <a:r>
+              <a:rPr lang="en-US" sz="2400" dirty="0"/>
+              <a:t>DEFINITION</a:t>
+            </a:r>
+          </a:p>
+        </p:txBody>
+      </p:sp>
+      <p:sp>
+        <p:nvSpPr>
+          <p:cNvPr id="22" name="TextBox 21"/>
+          <p:cNvSpPr txBox="1"/>
+          <p:nvPr/>
+        </p:nvSpPr>
+        <p:spPr>
+          <a:xfrm>
+            <a:off x="7314716" y="3826989"/>
+            <a:ext cx="3237651" cy="923330"/>
+          </a:xfrm>
+          <a:prstGeom prst="rect">
+            <a:avLst/>
+          </a:prstGeom>
+          <a:noFill/>
+          <a:ln>
+            <a:solidFill>
+              <a:schemeClr val="bg1">
+                <a:lumMod val="50000"/>
+              </a:schemeClr>
+            </a:solidFill>
+          </a:ln>
+        </p:spPr>
+        <p:txBody>
+          <a:bodyPr wrap="square" rtlCol="0">
+            <a:spAutoFit/>
+          </a:bodyPr>
+          <a:lstStyle/>
+          <a:p>
+            <a:endParaRPr lang="en-US" dirty="0">
+              <a:solidFill>
+                <a:schemeClr val="bg1">
+                  <a:lumMod val="50000"/>
+                </a:schemeClr>
+              </a:solidFill>
+            </a:endParaRPr>
+          </a:p>
+          <a:p>
+            <a:r>
+              <a:rPr lang="en-US" dirty="0">
+                <a:solidFill>
+                  <a:schemeClr val="bg1">
+                    <a:lumMod val="50000"/>
+                  </a:schemeClr>
+                </a:solidFill>
+              </a:rPr>
+              <a:t>Type Answer</a:t>
+            </a:r>
+          </a:p>
+          <a:p>
+            <a:endParaRPr lang="en-US" dirty="0">
+              <a:solidFill>
+                <a:schemeClr val="bg1">
+                  <a:lumMod val="50000"/>
+                </a:schemeClr>
+              </a:solidFill>
+            </a:endParaRPr>
+          </a:p>
+        </p:txBody>
+      </p:sp>
+      <p:sp>
+        <p:nvSpPr>
+          <p:cNvPr id="23" name="TextBox 22"/>
+          <p:cNvSpPr txBox="1"/>
+          <p:nvPr/>
+        </p:nvSpPr>
+        <p:spPr>
+          <a:xfrm>
+            <a:off x="9736663" y="4001906"/>
+            <a:ext cx="733344" cy="584775"/>
+          </a:xfrm>
+          <a:prstGeom prst="rect">
+            <a:avLst/>
+          </a:prstGeom>
+          <a:noFill/>
+          <a:ln>
+            <a:solidFill>
+              <a:schemeClr val="tx1"/>
+            </a:solidFill>
+          </a:ln>
+        </p:spPr>
+        <p:txBody>
+          <a:bodyPr wrap="square" rtlCol="0" anchor="ctr" anchorCtr="0">
+            <a:spAutoFit/>
+          </a:bodyPr>
+          <a:lstStyle/>
+          <a:p>
+            <a:pPr algn="ctr"/>
+            <a:r>
+              <a:rPr lang="en-US" sz="1600" dirty="0"/>
+              <a:t>Don’t Know</a:t>
+            </a:r>
+          </a:p>
+        </p:txBody>
+      </p:sp>
+      <p:sp>
+        <p:nvSpPr>
+          <p:cNvPr id="20" name="TextBox 19"/>
+          <p:cNvSpPr txBox="1"/>
+          <p:nvPr/>
+        </p:nvSpPr>
+        <p:spPr>
+          <a:xfrm>
+            <a:off x="2636490" y="124154"/>
             <a:ext cx="881075" cy="369332"/>
           </a:xfrm>
           <a:prstGeom prst="rect">
@@ -6887,23 +7526,264 @@
           <a:lstStyle/>
           <a:p>
             <a:r>
-              <a:rPr lang="en-US" dirty="0" smtClean="0"/>
-              <a:t>View_9</a:t>
+              <a:rPr lang="en-US" dirty="0"/>
+              <a:t>View_6</a:t>
+            </a:r>
+          </a:p>
+        </p:txBody>
+      </p:sp>
+      <p:sp>
+        <p:nvSpPr>
+          <p:cNvPr id="24" name="TextBox 23"/>
+          <p:cNvSpPr txBox="1"/>
+          <p:nvPr/>
+        </p:nvSpPr>
+        <p:spPr>
+          <a:xfrm>
+            <a:off x="8493003" y="129775"/>
+            <a:ext cx="881075" cy="369332"/>
+          </a:xfrm>
+          <a:prstGeom prst="rect">
+            <a:avLst/>
+          </a:prstGeom>
+          <a:noFill/>
+        </p:spPr>
+        <p:txBody>
+          <a:bodyPr wrap="none" rtlCol="0">
+            <a:spAutoFit/>
+          </a:bodyPr>
+          <a:lstStyle/>
+          <a:p>
+            <a:r>
+              <a:rPr lang="en-US" dirty="0"/>
+              <a:t>View_7</a:t>
+            </a:r>
+          </a:p>
+        </p:txBody>
+      </p:sp>
+      <p:sp>
+        <p:nvSpPr>
+          <p:cNvPr id="26" name="TextBox 25"/>
+          <p:cNvSpPr txBox="1"/>
+          <p:nvPr/>
+        </p:nvSpPr>
+        <p:spPr>
+          <a:xfrm>
+            <a:off x="8728529" y="6511988"/>
+            <a:ext cx="813043" cy="369332"/>
+          </a:xfrm>
+          <a:prstGeom prst="rect">
+            <a:avLst/>
+          </a:prstGeom>
+          <a:noFill/>
+        </p:spPr>
+        <p:txBody>
+          <a:bodyPr wrap="none" rtlCol="0">
+            <a:spAutoFit/>
+          </a:bodyPr>
+          <a:lstStyle/>
+          <a:p>
+            <a:r>
+              <a:rPr lang="en-US" dirty="0"/>
+              <a:t>WORD</a:t>
+            </a:r>
+          </a:p>
+        </p:txBody>
+      </p:sp>
+      <p:sp>
+        <p:nvSpPr>
+          <p:cNvPr id="27" name="TextBox 26"/>
+          <p:cNvSpPr txBox="1"/>
+          <p:nvPr/>
+        </p:nvSpPr>
+        <p:spPr>
+          <a:xfrm>
+            <a:off x="2636490" y="6469681"/>
+            <a:ext cx="1361370" cy="369332"/>
+          </a:xfrm>
+          <a:prstGeom prst="rect">
+            <a:avLst/>
+          </a:prstGeom>
+          <a:noFill/>
+        </p:spPr>
+        <p:txBody>
+          <a:bodyPr wrap="none" rtlCol="0">
+            <a:spAutoFit/>
+          </a:bodyPr>
+          <a:lstStyle/>
+          <a:p>
+            <a:r>
+              <a:rPr lang="en-US"/>
+              <a:t>WORDBOOK</a:t>
             </a:r>
             <a:endParaRPr lang="en-US" dirty="0"/>
           </a:p>
         </p:txBody>
       </p:sp>
-      <p:sp>
-        <p:nvSpPr>
-          <p:cNvPr id="16" name="TextBox 15"/>
+    </p:spTree>
+    <p:extLst>
+      <p:ext uri="{BB962C8B-B14F-4D97-AF65-F5344CB8AC3E}">
+        <p14:creationId xmlns:p14="http://schemas.microsoft.com/office/powerpoint/2010/main" val="576644425"/>
+      </p:ext>
+    </p:extLst>
+  </p:cSld>
+  <p:clrMapOvr>
+    <a:masterClrMapping/>
+  </p:clrMapOvr>
+</p:sld>
+</file>
+
+<file path=ppt/slides/slide5.xml><?xml version="1.0" encoding="utf-8"?>
+<p:sld xmlns:a="http://schemas.openxmlformats.org/drawingml/2006/main" xmlns:r="http://schemas.openxmlformats.org/officeDocument/2006/relationships" xmlns:p="http://schemas.openxmlformats.org/presentationml/2006/main">
+  <p:cSld>
+    <p:spTree>
+      <p:nvGrpSpPr>
+        <p:cNvPr id="1" name=""/>
+        <p:cNvGrpSpPr/>
+        <p:nvPr/>
+      </p:nvGrpSpPr>
+      <p:grpSpPr>
+        <a:xfrm>
+          <a:off x="0" y="0"/>
+          <a:ext cx="0" cy="0"/>
+          <a:chOff x="0" y="0"/>
+          <a:chExt cx="0" cy="0"/>
+        </a:xfrm>
+      </p:grpSpPr>
+      <p:sp>
+        <p:nvSpPr>
+          <p:cNvPr id="6" name="Frame 5"/>
+          <p:cNvSpPr/>
+          <p:nvPr/>
+        </p:nvSpPr>
+        <p:spPr>
+          <a:xfrm>
+            <a:off x="1248228" y="478972"/>
+            <a:ext cx="3657600" cy="5943600"/>
+          </a:xfrm>
+          <a:prstGeom prst="frame">
+            <a:avLst>
+              <a:gd name="adj1" fmla="val 992"/>
+            </a:avLst>
+          </a:prstGeom>
+          <a:ln/>
+        </p:spPr>
+        <p:style>
+          <a:lnRef idx="2">
+            <a:schemeClr val="dk1">
+              <a:shade val="50000"/>
+            </a:schemeClr>
+          </a:lnRef>
+          <a:fillRef idx="1">
+            <a:schemeClr val="dk1"/>
+          </a:fillRef>
+          <a:effectRef idx="0">
+            <a:schemeClr val="dk1"/>
+          </a:effectRef>
+          <a:fontRef idx="minor">
+            <a:schemeClr val="lt1"/>
+          </a:fontRef>
+        </p:style>
+        <p:txBody>
+          <a:bodyPr rtlCol="0" anchor="ctr"/>
+          <a:lstStyle/>
+          <a:p>
+            <a:pPr algn="ctr"/>
+            <a:endParaRPr lang="en-US">
+              <a:solidFill>
+                <a:schemeClr val="tx1"/>
+              </a:solidFill>
+            </a:endParaRPr>
+          </a:p>
+        </p:txBody>
+      </p:sp>
+      <p:sp>
+        <p:nvSpPr>
+          <p:cNvPr id="7" name="Frame 6"/>
+          <p:cNvSpPr/>
+          <p:nvPr/>
+        </p:nvSpPr>
+        <p:spPr>
+          <a:xfrm>
+            <a:off x="7104742" y="478972"/>
+            <a:ext cx="3657600" cy="5943600"/>
+          </a:xfrm>
+          <a:prstGeom prst="frame">
+            <a:avLst>
+              <a:gd name="adj1" fmla="val 992"/>
+            </a:avLst>
+          </a:prstGeom>
+          <a:ln/>
+        </p:spPr>
+        <p:style>
+          <a:lnRef idx="2">
+            <a:schemeClr val="dk1">
+              <a:shade val="50000"/>
+            </a:schemeClr>
+          </a:lnRef>
+          <a:fillRef idx="1">
+            <a:schemeClr val="dk1"/>
+          </a:fillRef>
+          <a:effectRef idx="0">
+            <a:schemeClr val="dk1"/>
+          </a:effectRef>
+          <a:fontRef idx="minor">
+            <a:schemeClr val="lt1"/>
+          </a:fontRef>
+        </p:style>
+        <p:txBody>
+          <a:bodyPr rtlCol="0" anchor="ctr"/>
+          <a:lstStyle/>
+          <a:p>
+            <a:pPr algn="ctr"/>
+            <a:endParaRPr lang="en-US">
+              <a:solidFill>
+                <a:schemeClr val="tx1"/>
+              </a:solidFill>
+            </a:endParaRPr>
+          </a:p>
+        </p:txBody>
+      </p:sp>
+      <p:cxnSp>
+        <p:nvCxnSpPr>
+          <p:cNvPr id="8" name="Straight Connector 7"/>
+          <p:cNvCxnSpPr/>
+          <p:nvPr/>
+        </p:nvCxnSpPr>
+        <p:spPr>
+          <a:xfrm>
+            <a:off x="1248228" y="1190172"/>
+            <a:ext cx="3657600" cy="0"/>
+          </a:xfrm>
+          <a:prstGeom prst="line">
+            <a:avLst/>
+          </a:prstGeom>
+        </p:spPr>
+        <p:style>
+          <a:lnRef idx="1">
+            <a:schemeClr val="dk1"/>
+          </a:lnRef>
+          <a:fillRef idx="0">
+            <a:schemeClr val="dk1"/>
+          </a:fillRef>
+          <a:effectRef idx="0">
+            <a:schemeClr val="dk1"/>
+          </a:effectRef>
+          <a:fontRef idx="minor">
+            <a:schemeClr val="tx1"/>
+          </a:fontRef>
+        </p:style>
+      </p:cxnSp>
+      <p:sp>
+        <p:nvSpPr>
+          <p:cNvPr id="9" name="TextBox 8"/>
           <p:cNvSpPr txBox="1"/>
           <p:nvPr/>
         </p:nvSpPr>
         <p:spPr>
-          <a:xfrm>
-            <a:off x="2179560" y="2989107"/>
-            <a:ext cx="1794933" cy="923330"/>
+          <a:xfrm rot="5400000">
+            <a:off x="4426647" y="646122"/>
+            <a:ext cx="496697" cy="461665"/>
           </a:xfrm>
           <a:prstGeom prst="rect">
             <a:avLst/>
@@ -6916,9 +7796,190 @@
           </a:bodyPr>
           <a:lstStyle/>
           <a:p>
+            <a:r>
+              <a:rPr lang="en-US" sz="2400" dirty="0"/>
+              <a:t>...</a:t>
+            </a:r>
+          </a:p>
+        </p:txBody>
+      </p:sp>
+      <p:sp>
+        <p:nvSpPr>
+          <p:cNvPr id="10" name="TextBox 9"/>
+          <p:cNvSpPr txBox="1"/>
+          <p:nvPr/>
+        </p:nvSpPr>
+        <p:spPr>
+          <a:xfrm>
+            <a:off x="1437344" y="689258"/>
+            <a:ext cx="463588" cy="369332"/>
+          </a:xfrm>
+          <a:prstGeom prst="rect">
+            <a:avLst/>
+          </a:prstGeom>
+          <a:noFill/>
+        </p:spPr>
+        <p:txBody>
+          <a:bodyPr wrap="none" rtlCol="0">
+            <a:spAutoFit/>
+          </a:bodyPr>
+          <a:lstStyle/>
+          <a:p>
+            <a:r>
+              <a:rPr lang="en-US" dirty="0">
+                <a:sym typeface="Wingdings"/>
+              </a:rPr>
+              <a:t> </a:t>
+            </a:r>
+            <a:endParaRPr lang="en-US" dirty="0"/>
+          </a:p>
+        </p:txBody>
+      </p:sp>
+      <p:cxnSp>
+        <p:nvCxnSpPr>
+          <p:cNvPr id="11" name="Straight Connector 10"/>
+          <p:cNvCxnSpPr/>
+          <p:nvPr/>
+        </p:nvCxnSpPr>
+        <p:spPr>
+          <a:xfrm>
+            <a:off x="7104742" y="1190172"/>
+            <a:ext cx="3657600" cy="0"/>
+          </a:xfrm>
+          <a:prstGeom prst="line">
+            <a:avLst/>
+          </a:prstGeom>
+        </p:spPr>
+        <p:style>
+          <a:lnRef idx="1">
+            <a:schemeClr val="dk1"/>
+          </a:lnRef>
+          <a:fillRef idx="0">
+            <a:schemeClr val="dk1"/>
+          </a:fillRef>
+          <a:effectRef idx="0">
+            <a:schemeClr val="dk1"/>
+          </a:effectRef>
+          <a:fontRef idx="minor">
+            <a:schemeClr val="tx1"/>
+          </a:fontRef>
+        </p:style>
+      </p:cxnSp>
+      <p:sp>
+        <p:nvSpPr>
+          <p:cNvPr id="13" name="TextBox 12"/>
+          <p:cNvSpPr txBox="1"/>
+          <p:nvPr/>
+        </p:nvSpPr>
+        <p:spPr>
+          <a:xfrm>
+            <a:off x="7293858" y="689258"/>
+            <a:ext cx="463588" cy="369332"/>
+          </a:xfrm>
+          <a:prstGeom prst="rect">
+            <a:avLst/>
+          </a:prstGeom>
+          <a:noFill/>
+        </p:spPr>
+        <p:txBody>
+          <a:bodyPr wrap="none" rtlCol="0">
+            <a:spAutoFit/>
+          </a:bodyPr>
+          <a:lstStyle/>
+          <a:p>
+            <a:r>
+              <a:rPr lang="en-US" dirty="0">
+                <a:sym typeface="Wingdings"/>
+              </a:rPr>
+              <a:t> </a:t>
+            </a:r>
+            <a:endParaRPr lang="en-US" dirty="0"/>
+          </a:p>
+        </p:txBody>
+      </p:sp>
+      <p:sp>
+        <p:nvSpPr>
+          <p:cNvPr id="14" name="TextBox 13"/>
+          <p:cNvSpPr txBox="1"/>
+          <p:nvPr/>
+        </p:nvSpPr>
+        <p:spPr>
+          <a:xfrm>
+            <a:off x="2636490" y="124154"/>
+            <a:ext cx="881075" cy="369332"/>
+          </a:xfrm>
+          <a:prstGeom prst="rect">
+            <a:avLst/>
+          </a:prstGeom>
+          <a:noFill/>
+        </p:spPr>
+        <p:txBody>
+          <a:bodyPr wrap="none" rtlCol="0">
+            <a:spAutoFit/>
+          </a:bodyPr>
+          <a:lstStyle/>
+          <a:p>
+            <a:r>
+              <a:rPr lang="en-US" dirty="0"/>
+              <a:t>View_8</a:t>
+            </a:r>
+          </a:p>
+        </p:txBody>
+      </p:sp>
+      <p:sp>
+        <p:nvSpPr>
+          <p:cNvPr id="15" name="TextBox 14"/>
+          <p:cNvSpPr txBox="1"/>
+          <p:nvPr/>
+        </p:nvSpPr>
+        <p:spPr>
+          <a:xfrm>
+            <a:off x="8493003" y="129775"/>
+            <a:ext cx="881075" cy="369332"/>
+          </a:xfrm>
+          <a:prstGeom prst="rect">
+            <a:avLst/>
+          </a:prstGeom>
+          <a:noFill/>
+        </p:spPr>
+        <p:txBody>
+          <a:bodyPr wrap="none" rtlCol="0">
+            <a:spAutoFit/>
+          </a:bodyPr>
+          <a:lstStyle/>
+          <a:p>
+            <a:r>
+              <a:rPr lang="en-US" dirty="0"/>
+              <a:t>View_9</a:t>
+            </a:r>
+          </a:p>
+        </p:txBody>
+      </p:sp>
+      <p:sp>
+        <p:nvSpPr>
+          <p:cNvPr id="16" name="TextBox 15"/>
+          <p:cNvSpPr txBox="1"/>
+          <p:nvPr/>
+        </p:nvSpPr>
+        <p:spPr>
+          <a:xfrm>
+            <a:off x="2179560" y="2989107"/>
+            <a:ext cx="1794933" cy="923330"/>
+          </a:xfrm>
+          <a:prstGeom prst="rect">
+            <a:avLst/>
+          </a:prstGeom>
+          <a:noFill/>
+        </p:spPr>
+        <p:txBody>
+          <a:bodyPr wrap="square" rtlCol="0">
+            <a:spAutoFit/>
+          </a:bodyPr>
+          <a:lstStyle/>
+          <a:p>
             <a:pPr algn="ctr"/>
             <a:r>
-              <a:rPr lang="en-US" dirty="0" smtClean="0"/>
+              <a:rPr lang="en-US" dirty="0"/>
               <a:t>MATCH</a:t>
             </a:r>
           </a:p>
@@ -6929,7 +7990,7 @@
           <a:p>
             <a:pPr algn="ctr"/>
             <a:r>
-              <a:rPr lang="en-US" dirty="0" smtClean="0"/>
+              <a:rPr lang="en-US" dirty="0"/>
               <a:t>(GAME)</a:t>
             </a:r>
           </a:p>
@@ -6967,14 +8028,13 @@
           <a:lstStyle/>
           <a:p>
             <a:r>
-              <a:rPr lang="en-US" sz="1400" i="1" dirty="0" smtClean="0"/>
+              <a:rPr lang="en-US" sz="1400" i="1" dirty="0"/>
               <a:t>  </a:t>
             </a:r>
             <a:r>
-              <a:rPr lang="en-US" sz="1400" i="1" u="sng" dirty="0" smtClean="0"/>
+              <a:rPr lang="en-US" sz="1400" i="1" u="sng" dirty="0"/>
               <a:t>username</a:t>
             </a:r>
-            <a:endParaRPr lang="en-US" sz="1400" i="1" u="sng" dirty="0"/>
           </a:p>
         </p:txBody>
       </p:sp>
@@ -7009,25 +8069,21 @@
               </a:spcAft>
             </a:pPr>
             <a:r>
-              <a:rPr lang="en-US" sz="500" dirty="0" smtClean="0"/>
+              <a:rPr lang="en-US" sz="500" dirty="0"/>
               <a:t> </a:t>
             </a:r>
-            <a:r>
-              <a:rPr lang="en-US" sz="1600" dirty="0" smtClean="0"/>
-              <a:t/>
-            </a:r>
             <a:br>
-              <a:rPr lang="en-US" sz="1600" dirty="0" smtClean="0"/>
+              <a:rPr lang="en-US" sz="1600" dirty="0"/>
             </a:br>
             <a:r>
-              <a:rPr lang="en-US" sz="1600" dirty="0" smtClean="0"/>
+              <a:rPr lang="en-US" sz="1600" dirty="0"/>
               <a:t>  Account Settings</a:t>
             </a:r>
             <a:r>
-              <a:rPr lang="en-US" sz="800" dirty="0" smtClean="0"/>
+              <a:rPr lang="en-US" sz="800" dirty="0"/>
               <a:t> </a:t>
             </a:r>
-            <a:endParaRPr lang="en-US" sz="1600" dirty="0" smtClean="0"/>
+            <a:endParaRPr lang="en-US" sz="1600" dirty="0"/>
           </a:p>
         </p:txBody>
       </p:sp>
@@ -7063,14 +8119,13 @@
           <a:lstStyle/>
           <a:p>
             <a:r>
-              <a:rPr lang="en-US" sz="1400" i="1" dirty="0" smtClean="0"/>
+              <a:rPr lang="en-US" sz="1400" i="1" dirty="0"/>
               <a:t>  </a:t>
             </a:r>
             <a:r>
-              <a:rPr lang="en-US" sz="1400" dirty="0" smtClean="0"/>
+              <a:rPr lang="en-US" sz="1400" dirty="0"/>
               <a:t>Support</a:t>
             </a:r>
-            <a:endParaRPr lang="en-US" sz="1400" dirty="0"/>
           </a:p>
         </p:txBody>
       </p:sp>
@@ -7105,18 +8160,14 @@
               </a:spcAft>
             </a:pPr>
             <a:r>
-              <a:rPr lang="en-US" sz="500" dirty="0" smtClean="0"/>
+              <a:rPr lang="en-US" sz="500" dirty="0"/>
               <a:t> </a:t>
             </a:r>
-            <a:r>
-              <a:rPr lang="en-US" sz="1600" dirty="0" smtClean="0"/>
-              <a:t/>
-            </a:r>
             <a:br>
-              <a:rPr lang="en-US" sz="1600" dirty="0" smtClean="0"/>
+              <a:rPr lang="en-US" sz="1600" dirty="0"/>
             </a:br>
             <a:r>
-              <a:rPr lang="en-US" sz="1600" dirty="0" smtClean="0"/>
+              <a:rPr lang="en-US" sz="1600" dirty="0"/>
               <a:t>  Send Feedback</a:t>
             </a:r>
           </a:p>
@@ -7154,10 +8205,9 @@
           <a:lstStyle/>
           <a:p>
             <a:r>
-              <a:rPr lang="en-US" sz="1400" dirty="0" smtClean="0"/>
+              <a:rPr lang="en-US" sz="1400" dirty="0"/>
               <a:t>  About</a:t>
             </a:r>
-            <a:endParaRPr lang="en-US" sz="1400" dirty="0"/>
           </a:p>
         </p:txBody>
       </p:sp>
@@ -7195,18 +8245,14 @@
               </a:spcAft>
             </a:pPr>
             <a:r>
-              <a:rPr lang="en-US" sz="500" dirty="0" smtClean="0"/>
+              <a:rPr lang="en-US" sz="500" dirty="0"/>
               <a:t> </a:t>
             </a:r>
-            <a:r>
-              <a:rPr lang="en-US" sz="1600" dirty="0" smtClean="0"/>
-              <a:t/>
-            </a:r>
             <a:br>
-              <a:rPr lang="en-US" sz="1600" dirty="0" smtClean="0"/>
+              <a:rPr lang="en-US" sz="1600" dirty="0"/>
             </a:br>
             <a:r>
-              <a:rPr lang="en-US" sz="1600" dirty="0" smtClean="0"/>
+              <a:rPr lang="en-US" sz="1600" dirty="0"/>
               <a:t>  Rate Us!</a:t>
             </a:r>
           </a:p>
@@ -7280,18 +8326,14 @@
               </a:spcAft>
             </a:pPr>
             <a:r>
-              <a:rPr lang="en-US" sz="500" dirty="0" smtClean="0"/>
+              <a:rPr lang="en-US" sz="500" dirty="0"/>
               <a:t> </a:t>
             </a:r>
-            <a:r>
-              <a:rPr lang="en-US" sz="1600" dirty="0" smtClean="0"/>
-              <a:t/>
-            </a:r>
             <a:br>
-              <a:rPr lang="en-US" sz="1600" dirty="0" smtClean="0"/>
+              <a:rPr lang="en-US" sz="1600" dirty="0"/>
             </a:br>
             <a:r>
-              <a:rPr lang="en-US" sz="1600" dirty="0" smtClean="0"/>
+              <a:rPr lang="en-US" sz="1600" dirty="0"/>
               <a:t>  Privacy Policy</a:t>
             </a:r>
           </a:p>
@@ -7331,18 +8373,14 @@
               </a:spcAft>
             </a:pPr>
             <a:r>
-              <a:rPr lang="en-US" sz="500" dirty="0" smtClean="0"/>
+              <a:rPr lang="en-US" sz="500" dirty="0"/>
               <a:t> </a:t>
             </a:r>
-            <a:r>
-              <a:rPr lang="en-US" sz="1600" dirty="0" smtClean="0"/>
-              <a:t/>
-            </a:r>
             <a:br>
-              <a:rPr lang="en-US" sz="1600" dirty="0" smtClean="0"/>
+              <a:rPr lang="en-US" sz="1600" dirty="0"/>
             </a:br>
             <a:r>
-              <a:rPr lang="en-US" sz="1600" dirty="0" smtClean="0"/>
+              <a:rPr lang="en-US" sz="1600" dirty="0"/>
               <a:t>  Terms of Service</a:t>
             </a:r>
           </a:p>
@@ -7419,22 +8457,18 @@
               </a:spcAft>
             </a:pPr>
             <a:r>
-              <a:rPr lang="en-US" sz="500" dirty="0" smtClean="0"/>
+              <a:rPr lang="en-US" sz="500" dirty="0"/>
               <a:t> </a:t>
             </a:r>
-            <a:r>
-              <a:rPr lang="en-US" sz="1600" dirty="0" smtClean="0"/>
-              <a:t/>
-            </a:r>
             <a:br>
-              <a:rPr lang="en-US" sz="1600" dirty="0" smtClean="0"/>
+              <a:rPr lang="en-US" sz="1600" dirty="0"/>
             </a:br>
             <a:r>
-              <a:rPr lang="en-US" sz="1600" dirty="0" smtClean="0"/>
+              <a:rPr lang="en-US" sz="1600" dirty="0"/>
               <a:t>  Log out of </a:t>
             </a:r>
             <a:r>
-              <a:rPr lang="en-US" sz="1600" i="1" u="sng" dirty="0" smtClean="0"/>
+              <a:rPr lang="en-US" sz="1600" i="1" u="sng" dirty="0"/>
               <a:t>username</a:t>
             </a:r>
           </a:p>
@@ -7500,10 +8534,9 @@
           <a:lstStyle/>
           <a:p>
             <a:r>
-              <a:rPr lang="en-US" dirty="0" smtClean="0"/>
+              <a:rPr lang="en-US" dirty="0"/>
               <a:t>MATCH</a:t>
             </a:r>
-            <a:endParaRPr lang="en-US" dirty="0"/>
           </a:p>
         </p:txBody>
       </p:sp>
@@ -7530,10 +8563,9 @@
           <a:lstStyle/>
           <a:p>
             <a:r>
-              <a:rPr lang="en-US" dirty="0" smtClean="0"/>
+              <a:rPr lang="en-US" dirty="0"/>
               <a:t>SETTING</a:t>
             </a:r>
-            <a:endParaRPr lang="en-US" dirty="0"/>
           </a:p>
         </p:txBody>
       </p:sp>
@@ -7541,6 +8573,139 @@
     <p:extLst>
       <p:ext uri="{BB962C8B-B14F-4D97-AF65-F5344CB8AC3E}">
         <p14:creationId xmlns:p14="http://schemas.microsoft.com/office/powerpoint/2010/main" val="1292690461"/>
+      </p:ext>
+    </p:extLst>
+  </p:cSld>
+  <p:clrMapOvr>
+    <a:masterClrMapping/>
+  </p:clrMapOvr>
+</p:sld>
+</file>
+
+<file path=ppt/slides/slide6.xml><?xml version="1.0" encoding="utf-8"?>
+<p:sld xmlns:a="http://schemas.openxmlformats.org/drawingml/2006/main" xmlns:r="http://schemas.openxmlformats.org/officeDocument/2006/relationships" xmlns:p="http://schemas.openxmlformats.org/presentationml/2006/main">
+  <p:cSld>
+    <p:spTree>
+      <p:nvGrpSpPr>
+        <p:cNvPr id="1" name=""/>
+        <p:cNvGrpSpPr/>
+        <p:nvPr/>
+      </p:nvGrpSpPr>
+      <p:grpSpPr>
+        <a:xfrm>
+          <a:off x="0" y="0"/>
+          <a:ext cx="0" cy="0"/>
+          <a:chOff x="0" y="0"/>
+          <a:chExt cx="0" cy="0"/>
+        </a:xfrm>
+      </p:grpSpPr>
+      <p:sp>
+        <p:nvSpPr>
+          <p:cNvPr id="2" name="TextBox 1"/>
+          <p:cNvSpPr txBox="1"/>
+          <p:nvPr/>
+        </p:nvSpPr>
+        <p:spPr>
+          <a:xfrm>
+            <a:off x="0" y="0"/>
+            <a:ext cx="13312587" cy="2862322"/>
+          </a:xfrm>
+          <a:prstGeom prst="rect">
+            <a:avLst/>
+          </a:prstGeom>
+          <a:noFill/>
+        </p:spPr>
+        <p:txBody>
+          <a:bodyPr wrap="square" rtlCol="0">
+            <a:spAutoFit/>
+          </a:bodyPr>
+          <a:lstStyle/>
+          <a:p>
+            <a:pPr marL="342900" indent="-342900">
+              <a:buAutoNum type="arabicPeriod"/>
+            </a:pPr>
+            <a:r>
+              <a:rPr lang="en-US" dirty="0"/>
+              <a:t>No sign-up button on view-2</a:t>
+            </a:r>
+          </a:p>
+          <a:p>
+            <a:pPr marL="342900" indent="-342900">
+              <a:buAutoNum type="arabicPeriod"/>
+            </a:pPr>
+            <a:r>
+              <a:rPr lang="en-US" dirty="0"/>
+              <a:t>Need to create activities for all the settings, send feedback, </a:t>
+            </a:r>
+            <a:r>
+              <a:rPr lang="en-US" dirty="0" err="1"/>
+              <a:t>etc</a:t>
+            </a:r>
+            <a:endParaRPr lang="en-US" dirty="0"/>
+          </a:p>
+          <a:p>
+            <a:pPr marL="342900" indent="-342900">
+              <a:buAutoNum type="arabicPeriod"/>
+            </a:pPr>
+            <a:r>
+              <a:rPr lang="en-US" dirty="0"/>
+              <a:t>Create Class B_3 and Folder B_4</a:t>
+            </a:r>
+          </a:p>
+          <a:p>
+            <a:pPr marL="342900" indent="-342900">
+              <a:buAutoNum type="arabicPeriod"/>
+            </a:pPr>
+            <a:r>
+              <a:rPr lang="en-US" dirty="0"/>
+              <a:t>Sign up with Facebook and Google plus</a:t>
+            </a:r>
+          </a:p>
+          <a:p>
+            <a:pPr marL="342900" indent="-342900">
+              <a:buAutoNum type="arabicPeriod"/>
+            </a:pPr>
+            <a:r>
+              <a:rPr lang="en-US" dirty="0"/>
+              <a:t>Policy and Terms of Service</a:t>
+            </a:r>
+          </a:p>
+          <a:p>
+            <a:pPr marL="342900" indent="-342900">
+              <a:buAutoNum type="arabicPeriod"/>
+            </a:pPr>
+            <a:endParaRPr lang="en-US" dirty="0"/>
+          </a:p>
+          <a:p>
+            <a:pPr marL="342900" indent="-342900">
+              <a:buAutoNum type="arabicPeriod"/>
+            </a:pPr>
+            <a:endParaRPr lang="en-US" dirty="0"/>
+          </a:p>
+          <a:p>
+            <a:pPr marL="342900" indent="-342900">
+              <a:buAutoNum type="arabicPeriod"/>
+            </a:pPr>
+            <a:endParaRPr lang="en-US" dirty="0"/>
+          </a:p>
+          <a:p>
+            <a:pPr marL="342900" indent="-342900">
+              <a:buAutoNum type="arabicPeriod"/>
+            </a:pPr>
+            <a:endParaRPr lang="en-US" dirty="0"/>
+          </a:p>
+          <a:p>
+            <a:pPr marL="342900" indent="-342900">
+              <a:buAutoNum type="arabicPeriod"/>
+            </a:pPr>
+            <a:endParaRPr lang="en-US" dirty="0"/>
+          </a:p>
+        </p:txBody>
+      </p:sp>
+    </p:spTree>
+    <p:extLst>
+      <p:ext uri="{BB962C8B-B14F-4D97-AF65-F5344CB8AC3E}">
+        <p14:creationId xmlns:p14="http://schemas.microsoft.com/office/powerpoint/2010/main" val="1260417836"/>
       </p:ext>
     </p:extLst>
   </p:cSld>
@@ -7805,7 +8970,7 @@
   <a:extraClrSchemeLst/>
   <a:extLst>
     <a:ext uri="{05A4C25C-085E-4340-85A3-A5531E510DB2}">
-      <thm15:themeFamily xmlns:thm15="http://schemas.microsoft.com/office/thememl/2012/main" xmlns="" name="Office Theme" id="{62F939B6-93AF-4DB8-9C6B-D6C7DFDC589F}" vid="{4A3C46E8-61CC-4603-A589-7422A47A8E4A}"/>
+      <thm15:themeFamily xmlns:thm15="http://schemas.microsoft.com/office/thememl/2012/main" name="Office Theme" id="{62F939B6-93AF-4DB8-9C6B-D6C7DFDC589F}" vid="{4A3C46E8-61CC-4603-A589-7422A47A8E4A}"/>
     </a:ext>
   </a:extLst>
 </a:theme>

</xml_diff>